<commit_message>
Added prng_a results to poster as a table under Findings
</commit_message>
<xml_diff>
--- a/PRNG_PosterRoughDraft.pptx
+++ b/PRNG_PosterRoughDraft.pptx
@@ -104,6 +104,11 @@
       </a:defRPr>
     </a:lvl9pPr>
   </p:defaultTextStyle>
+  <p:extLst>
+    <p:ext uri="{EFAFB233-063F-42B5-8137-9DF3F51BA10A}">
+      <p15:sldGuideLst xmlns:p15="http://schemas.microsoft.com/office/powerpoint/2012/main"/>
+    </p:ext>
+  </p:extLst>
 </p:presentation>
 </file>
 
@@ -4078,7 +4083,7 @@
               </a:lnSpc>
             </a:pPr>
             <a:r>
-              <a:rPr lang="en-US" sz="2250" b="0" strike="noStrike" spc="-1">
+              <a:rPr lang="en-US" sz="2100" b="0" strike="noStrike" spc="-1" dirty="0">
                 <a:solidFill>
                   <a:srgbClr val="000000"/>
                 </a:solidFill>
@@ -4092,17 +4097,6 @@
               </a:rPr>
               <a:t>The results of the testing of our methods mentioned above. Placeholder image to the left that I assume is replaced by graphs of our findings displaying the serial vs parallelized versions of each method. The graphs can focus on two main criteria for solving the MCS problems; a comparison between the speed and accuracy of the two. By increasing one, are we giving up any of the other.</a:t>
             </a:r>
-            <a:endParaRPr lang="en-US" sz="1800" b="0" strike="noStrike" spc="-1">
-              <a:solidFill>
-                <a:srgbClr val="000000"/>
-              </a:solidFill>
-              <a:uFill>
-                <a:solidFill>
-                  <a:srgbClr val="FFFFFF"/>
-                </a:solidFill>
-              </a:uFill>
-              <a:latin typeface="Arial"/>
-            </a:endParaRPr>
           </a:p>
         </p:txBody>
       </p:sp>
@@ -4310,6 +4304,1239 @@
           </a:p>
         </p:txBody>
       </p:sp>
+      <p:graphicFrame>
+        <p:nvGraphicFramePr>
+          <p:cNvPr id="4" name="Table 3">
+            <a:extLst>
+              <a:ext uri="{FF2B5EF4-FFF2-40B4-BE49-F238E27FC236}">
+                <a16:creationId xmlns:a16="http://schemas.microsoft.com/office/drawing/2014/main" id="{4F85F7EF-2D6E-4508-AF1C-D5BA25BABA64}"/>
+              </a:ext>
+            </a:extLst>
+          </p:cNvPr>
+          <p:cNvGraphicFramePr>
+            <a:graphicFrameLocks noGrp="1"/>
+          </p:cNvGraphicFramePr>
+          <p:nvPr>
+            <p:extLst>
+              <p:ext uri="{D42A27DB-BD31-4B8C-83A1-F6EECF244321}">
+                <p14:modId xmlns:p14="http://schemas.microsoft.com/office/powerpoint/2010/main" val="3398005578"/>
+              </p:ext>
+            </p:extLst>
+          </p:nvPr>
+        </p:nvGraphicFramePr>
+        <p:xfrm>
+          <a:off x="17241840" y="10669751"/>
+          <a:ext cx="14838280" cy="2834640"/>
+        </p:xfrm>
+        <a:graphic>
+          <a:graphicData uri="http://schemas.openxmlformats.org/drawingml/2006/table">
+            <a:tbl>
+              <a:tblPr firstRow="1" bandRow="1">
+                <a:tableStyleId>{5C22544A-7EE6-4342-B048-85BDC9FD1C3A}</a:tableStyleId>
+              </a:tblPr>
+              <a:tblGrid>
+                <a:gridCol w="2967656">
+                  <a:extLst>
+                    <a:ext uri="{9D8B030D-6E8A-4147-A177-3AD203B41FA5}">
+                      <a16:colId xmlns:a16="http://schemas.microsoft.com/office/drawing/2014/main" val="335167617"/>
+                    </a:ext>
+                  </a:extLst>
+                </a:gridCol>
+                <a:gridCol w="2967656">
+                  <a:extLst>
+                    <a:ext uri="{9D8B030D-6E8A-4147-A177-3AD203B41FA5}">
+                      <a16:colId xmlns:a16="http://schemas.microsoft.com/office/drawing/2014/main" val="808033953"/>
+                    </a:ext>
+                  </a:extLst>
+                </a:gridCol>
+                <a:gridCol w="2967656">
+                  <a:extLst>
+                    <a:ext uri="{9D8B030D-6E8A-4147-A177-3AD203B41FA5}">
+                      <a16:colId xmlns:a16="http://schemas.microsoft.com/office/drawing/2014/main" val="165993530"/>
+                    </a:ext>
+                  </a:extLst>
+                </a:gridCol>
+                <a:gridCol w="2967656">
+                  <a:extLst>
+                    <a:ext uri="{9D8B030D-6E8A-4147-A177-3AD203B41FA5}">
+                      <a16:colId xmlns:a16="http://schemas.microsoft.com/office/drawing/2014/main" val="1302557478"/>
+                    </a:ext>
+                  </a:extLst>
+                </a:gridCol>
+                <a:gridCol w="2967656">
+                  <a:extLst>
+                    <a:ext uri="{9D8B030D-6E8A-4147-A177-3AD203B41FA5}">
+                      <a16:colId xmlns:a16="http://schemas.microsoft.com/office/drawing/2014/main" val="3023074935"/>
+                    </a:ext>
+                  </a:extLst>
+                </a:gridCol>
+              </a:tblGrid>
+              <a:tr h="323303">
+                <a:tc>
+                  <a:txBody>
+                    <a:bodyPr/>
+                    <a:lstStyle/>
+                    <a:p>
+                      <a:r>
+                        <a:rPr lang="en-US" dirty="0" err="1"/>
+                        <a:t>MiddleSquare</a:t>
+                      </a:r>
+                      <a:r>
+                        <a:rPr lang="en-US" dirty="0"/>
+                        <a:t> Serial</a:t>
+                      </a:r>
+                    </a:p>
+                  </a:txBody>
+                  <a:tcPr>
+                    <a:lnL w="12700" cap="flat" cmpd="sng" algn="ctr">
+                      <a:solidFill>
+                        <a:schemeClr val="tx1"/>
+                      </a:solidFill>
+                      <a:prstDash val="solid"/>
+                      <a:round/>
+                      <a:headEnd type="none" w="med" len="med"/>
+                      <a:tailEnd type="none" w="med" len="med"/>
+                    </a:lnL>
+                    <a:lnR w="12700" cap="flat" cmpd="sng" algn="ctr">
+                      <a:solidFill>
+                        <a:schemeClr val="tx1"/>
+                      </a:solidFill>
+                      <a:prstDash val="solid"/>
+                      <a:round/>
+                      <a:headEnd type="none" w="med" len="med"/>
+                      <a:tailEnd type="none" w="med" len="med"/>
+                    </a:lnR>
+                    <a:lnT w="12700" cap="flat" cmpd="sng" algn="ctr">
+                      <a:solidFill>
+                        <a:schemeClr val="tx1"/>
+                      </a:solidFill>
+                      <a:prstDash val="solid"/>
+                      <a:round/>
+                      <a:headEnd type="none" w="med" len="med"/>
+                      <a:tailEnd type="none" w="med" len="med"/>
+                    </a:lnT>
+                    <a:lnB w="12700" cap="flat" cmpd="sng" algn="ctr">
+                      <a:solidFill>
+                        <a:schemeClr val="tx1"/>
+                      </a:solidFill>
+                      <a:prstDash val="solid"/>
+                      <a:round/>
+                      <a:headEnd type="none" w="med" len="med"/>
+                      <a:tailEnd type="none" w="med" len="med"/>
+                    </a:lnB>
+                  </a:tcPr>
+                </a:tc>
+                <a:tc>
+                  <a:txBody>
+                    <a:bodyPr/>
+                    <a:lstStyle/>
+                    <a:p>
+                      <a:r>
+                        <a:rPr lang="en-US" dirty="0" err="1"/>
+                        <a:t>MiddleSquare</a:t>
+                      </a:r>
+                      <a:r>
+                        <a:rPr lang="en-US" dirty="0"/>
+                        <a:t> Parallel</a:t>
+                      </a:r>
+                    </a:p>
+                  </a:txBody>
+                  <a:tcPr>
+                    <a:lnL w="12700" cap="flat" cmpd="sng" algn="ctr">
+                      <a:solidFill>
+                        <a:schemeClr val="tx1"/>
+                      </a:solidFill>
+                      <a:prstDash val="solid"/>
+                      <a:round/>
+                      <a:headEnd type="none" w="med" len="med"/>
+                      <a:tailEnd type="none" w="med" len="med"/>
+                    </a:lnL>
+                    <a:lnR w="12700" cap="flat" cmpd="sng" algn="ctr">
+                      <a:solidFill>
+                        <a:schemeClr val="tx1"/>
+                      </a:solidFill>
+                      <a:prstDash val="solid"/>
+                      <a:round/>
+                      <a:headEnd type="none" w="med" len="med"/>
+                      <a:tailEnd type="none" w="med" len="med"/>
+                    </a:lnR>
+                    <a:lnT w="12700" cap="flat" cmpd="sng" algn="ctr">
+                      <a:solidFill>
+                        <a:schemeClr val="tx1"/>
+                      </a:solidFill>
+                      <a:prstDash val="solid"/>
+                      <a:round/>
+                      <a:headEnd type="none" w="med" len="med"/>
+                      <a:tailEnd type="none" w="med" len="med"/>
+                    </a:lnT>
+                    <a:lnB w="12700" cap="flat" cmpd="sng" algn="ctr">
+                      <a:solidFill>
+                        <a:schemeClr val="tx1"/>
+                      </a:solidFill>
+                      <a:prstDash val="solid"/>
+                      <a:round/>
+                      <a:headEnd type="none" w="med" len="med"/>
+                      <a:tailEnd type="none" w="med" len="med"/>
+                    </a:lnB>
+                  </a:tcPr>
+                </a:tc>
+                <a:tc>
+                  <a:txBody>
+                    <a:bodyPr/>
+                    <a:lstStyle/>
+                    <a:p>
+                      <a:r>
+                        <a:rPr lang="en-US" dirty="0"/>
+                        <a:t>LCG</a:t>
+                      </a:r>
+                    </a:p>
+                  </a:txBody>
+                  <a:tcPr>
+                    <a:lnL w="12700" cap="flat" cmpd="sng" algn="ctr">
+                      <a:solidFill>
+                        <a:schemeClr val="tx1"/>
+                      </a:solidFill>
+                      <a:prstDash val="solid"/>
+                      <a:round/>
+                      <a:headEnd type="none" w="med" len="med"/>
+                      <a:tailEnd type="none" w="med" len="med"/>
+                    </a:lnL>
+                    <a:lnR w="12700" cap="flat" cmpd="sng" algn="ctr">
+                      <a:solidFill>
+                        <a:schemeClr val="tx1"/>
+                      </a:solidFill>
+                      <a:prstDash val="solid"/>
+                      <a:round/>
+                      <a:headEnd type="none" w="med" len="med"/>
+                      <a:tailEnd type="none" w="med" len="med"/>
+                    </a:lnR>
+                    <a:lnT w="12700" cap="flat" cmpd="sng" algn="ctr">
+                      <a:solidFill>
+                        <a:schemeClr val="tx1"/>
+                      </a:solidFill>
+                      <a:prstDash val="solid"/>
+                      <a:round/>
+                      <a:headEnd type="none" w="med" len="med"/>
+                      <a:tailEnd type="none" w="med" len="med"/>
+                    </a:lnT>
+                    <a:lnB w="12700" cap="flat" cmpd="sng" algn="ctr">
+                      <a:solidFill>
+                        <a:schemeClr val="tx1"/>
+                      </a:solidFill>
+                      <a:prstDash val="solid"/>
+                      <a:round/>
+                      <a:headEnd type="none" w="med" len="med"/>
+                      <a:tailEnd type="none" w="med" len="med"/>
+                    </a:lnB>
+                  </a:tcPr>
+                </a:tc>
+                <a:tc>
+                  <a:txBody>
+                    <a:bodyPr/>
+                    <a:lstStyle/>
+                    <a:p>
+                      <a:r>
+                        <a:rPr lang="en-US" dirty="0" err="1"/>
+                        <a:t>ThreeFry</a:t>
+                      </a:r>
+                      <a:r>
+                        <a:rPr lang="en-US" dirty="0"/>
+                        <a:t> Serial</a:t>
+                      </a:r>
+                    </a:p>
+                  </a:txBody>
+                  <a:tcPr>
+                    <a:lnL w="12700" cap="flat" cmpd="sng" algn="ctr">
+                      <a:solidFill>
+                        <a:schemeClr val="tx1"/>
+                      </a:solidFill>
+                      <a:prstDash val="solid"/>
+                      <a:round/>
+                      <a:headEnd type="none" w="med" len="med"/>
+                      <a:tailEnd type="none" w="med" len="med"/>
+                    </a:lnL>
+                    <a:lnR w="12700" cap="flat" cmpd="sng" algn="ctr">
+                      <a:solidFill>
+                        <a:schemeClr val="tx1"/>
+                      </a:solidFill>
+                      <a:prstDash val="solid"/>
+                      <a:round/>
+                      <a:headEnd type="none" w="med" len="med"/>
+                      <a:tailEnd type="none" w="med" len="med"/>
+                    </a:lnR>
+                    <a:lnT w="12700" cap="flat" cmpd="sng" algn="ctr">
+                      <a:solidFill>
+                        <a:schemeClr val="tx1"/>
+                      </a:solidFill>
+                      <a:prstDash val="solid"/>
+                      <a:round/>
+                      <a:headEnd type="none" w="med" len="med"/>
+                      <a:tailEnd type="none" w="med" len="med"/>
+                    </a:lnT>
+                    <a:lnB w="12700" cap="flat" cmpd="sng" algn="ctr">
+                      <a:solidFill>
+                        <a:schemeClr val="tx1"/>
+                      </a:solidFill>
+                      <a:prstDash val="solid"/>
+                      <a:round/>
+                      <a:headEnd type="none" w="med" len="med"/>
+                      <a:tailEnd type="none" w="med" len="med"/>
+                    </a:lnB>
+                  </a:tcPr>
+                </a:tc>
+                <a:tc>
+                  <a:txBody>
+                    <a:bodyPr/>
+                    <a:lstStyle/>
+                    <a:p>
+                      <a:r>
+                        <a:rPr lang="en-US" dirty="0" err="1"/>
+                        <a:t>ThreeFry</a:t>
+                      </a:r>
+                      <a:r>
+                        <a:rPr lang="en-US" dirty="0"/>
+                        <a:t> Parallel</a:t>
+                      </a:r>
+                    </a:p>
+                  </a:txBody>
+                  <a:tcPr>
+                    <a:lnL w="12700" cap="flat" cmpd="sng" algn="ctr">
+                      <a:solidFill>
+                        <a:schemeClr val="tx1"/>
+                      </a:solidFill>
+                      <a:prstDash val="solid"/>
+                      <a:round/>
+                      <a:headEnd type="none" w="med" len="med"/>
+                      <a:tailEnd type="none" w="med" len="med"/>
+                    </a:lnL>
+                    <a:lnR w="12700" cap="flat" cmpd="sng" algn="ctr">
+                      <a:solidFill>
+                        <a:schemeClr val="tx1"/>
+                      </a:solidFill>
+                      <a:prstDash val="solid"/>
+                      <a:round/>
+                      <a:headEnd type="none" w="med" len="med"/>
+                      <a:tailEnd type="none" w="med" len="med"/>
+                    </a:lnR>
+                    <a:lnT w="12700" cap="flat" cmpd="sng" algn="ctr">
+                      <a:solidFill>
+                        <a:schemeClr val="tx1"/>
+                      </a:solidFill>
+                      <a:prstDash val="solid"/>
+                      <a:round/>
+                      <a:headEnd type="none" w="med" len="med"/>
+                      <a:tailEnd type="none" w="med" len="med"/>
+                    </a:lnT>
+                    <a:lnB w="12700" cap="flat" cmpd="sng" algn="ctr">
+                      <a:solidFill>
+                        <a:schemeClr val="tx1"/>
+                      </a:solidFill>
+                      <a:prstDash val="solid"/>
+                      <a:round/>
+                      <a:headEnd type="none" w="med" len="med"/>
+                      <a:tailEnd type="none" w="med" len="med"/>
+                    </a:lnB>
+                  </a:tcPr>
+                </a:tc>
+                <a:extLst>
+                  <a:ext uri="{0D108BD9-81ED-4DB2-BD59-A6C34878D82A}">
+                    <a16:rowId xmlns:a16="http://schemas.microsoft.com/office/drawing/2014/main" val="2961332224"/>
+                  </a:ext>
+                </a:extLst>
+              </a:tr>
+              <a:tr h="565780">
+                <a:tc>
+                  <a:txBody>
+                    <a:bodyPr/>
+                    <a:lstStyle/>
+                    <a:p>
+                      <a:r>
+                        <a:rPr lang="en-US" dirty="0"/>
+                        <a:t>Standard Deviation is 31.12 percent of the range</a:t>
+                      </a:r>
+                    </a:p>
+                  </a:txBody>
+                  <a:tcPr>
+                    <a:lnL w="12700" cap="flat" cmpd="sng" algn="ctr">
+                      <a:solidFill>
+                        <a:schemeClr val="tx1"/>
+                      </a:solidFill>
+                      <a:prstDash val="solid"/>
+                      <a:round/>
+                      <a:headEnd type="none" w="med" len="med"/>
+                      <a:tailEnd type="none" w="med" len="med"/>
+                    </a:lnL>
+                    <a:lnR w="12700" cap="flat" cmpd="sng" algn="ctr">
+                      <a:solidFill>
+                        <a:schemeClr val="tx1"/>
+                      </a:solidFill>
+                      <a:prstDash val="solid"/>
+                      <a:round/>
+                      <a:headEnd type="none" w="med" len="med"/>
+                      <a:tailEnd type="none" w="med" len="med"/>
+                    </a:lnR>
+                    <a:lnT w="12700" cap="flat" cmpd="sng" algn="ctr">
+                      <a:solidFill>
+                        <a:schemeClr val="tx1"/>
+                      </a:solidFill>
+                      <a:prstDash val="solid"/>
+                      <a:round/>
+                      <a:headEnd type="none" w="med" len="med"/>
+                      <a:tailEnd type="none" w="med" len="med"/>
+                    </a:lnT>
+                    <a:lnB w="12700" cap="flat" cmpd="sng" algn="ctr">
+                      <a:solidFill>
+                        <a:schemeClr val="tx1"/>
+                      </a:solidFill>
+                      <a:prstDash val="solid"/>
+                      <a:round/>
+                      <a:headEnd type="none" w="med" len="med"/>
+                      <a:tailEnd type="none" w="med" len="med"/>
+                    </a:lnB>
+                  </a:tcPr>
+                </a:tc>
+                <a:tc>
+                  <a:txBody>
+                    <a:bodyPr/>
+                    <a:lstStyle/>
+                    <a:p>
+                      <a:r>
+                        <a:rPr lang="en-US" dirty="0"/>
+                        <a:t>Standard Deviation is 32.33 percent of the range</a:t>
+                      </a:r>
+                    </a:p>
+                  </a:txBody>
+                  <a:tcPr>
+                    <a:lnL w="12700" cap="flat" cmpd="sng" algn="ctr">
+                      <a:solidFill>
+                        <a:schemeClr val="tx1"/>
+                      </a:solidFill>
+                      <a:prstDash val="solid"/>
+                      <a:round/>
+                      <a:headEnd type="none" w="med" len="med"/>
+                      <a:tailEnd type="none" w="med" len="med"/>
+                    </a:lnL>
+                    <a:lnR w="12700" cap="flat" cmpd="sng" algn="ctr">
+                      <a:solidFill>
+                        <a:schemeClr val="tx1"/>
+                      </a:solidFill>
+                      <a:prstDash val="solid"/>
+                      <a:round/>
+                      <a:headEnd type="none" w="med" len="med"/>
+                      <a:tailEnd type="none" w="med" len="med"/>
+                    </a:lnR>
+                    <a:lnT w="12700" cap="flat" cmpd="sng" algn="ctr">
+                      <a:solidFill>
+                        <a:schemeClr val="tx1"/>
+                      </a:solidFill>
+                      <a:prstDash val="solid"/>
+                      <a:round/>
+                      <a:headEnd type="none" w="med" len="med"/>
+                      <a:tailEnd type="none" w="med" len="med"/>
+                    </a:lnT>
+                    <a:lnB w="12700" cap="flat" cmpd="sng" algn="ctr">
+                      <a:solidFill>
+                        <a:schemeClr val="tx1"/>
+                      </a:solidFill>
+                      <a:prstDash val="solid"/>
+                      <a:round/>
+                      <a:headEnd type="none" w="med" len="med"/>
+                      <a:tailEnd type="none" w="med" len="med"/>
+                    </a:lnB>
+                  </a:tcPr>
+                </a:tc>
+                <a:tc>
+                  <a:txBody>
+                    <a:bodyPr/>
+                    <a:lstStyle/>
+                    <a:p>
+                      <a:r>
+                        <a:rPr lang="en-US" dirty="0"/>
+                        <a:t>Standard Deviation is 26.53 percent of the range</a:t>
+                      </a:r>
+                    </a:p>
+                  </a:txBody>
+                  <a:tcPr>
+                    <a:lnL w="12700" cap="flat" cmpd="sng" algn="ctr">
+                      <a:solidFill>
+                        <a:schemeClr val="tx1"/>
+                      </a:solidFill>
+                      <a:prstDash val="solid"/>
+                      <a:round/>
+                      <a:headEnd type="none" w="med" len="med"/>
+                      <a:tailEnd type="none" w="med" len="med"/>
+                    </a:lnL>
+                    <a:lnR w="12700" cap="flat" cmpd="sng" algn="ctr">
+                      <a:solidFill>
+                        <a:schemeClr val="tx1"/>
+                      </a:solidFill>
+                      <a:prstDash val="solid"/>
+                      <a:round/>
+                      <a:headEnd type="none" w="med" len="med"/>
+                      <a:tailEnd type="none" w="med" len="med"/>
+                    </a:lnR>
+                    <a:lnT w="12700" cap="flat" cmpd="sng" algn="ctr">
+                      <a:solidFill>
+                        <a:schemeClr val="tx1"/>
+                      </a:solidFill>
+                      <a:prstDash val="solid"/>
+                      <a:round/>
+                      <a:headEnd type="none" w="med" len="med"/>
+                      <a:tailEnd type="none" w="med" len="med"/>
+                    </a:lnT>
+                    <a:lnB w="12700" cap="flat" cmpd="sng" algn="ctr">
+                      <a:solidFill>
+                        <a:schemeClr val="tx1"/>
+                      </a:solidFill>
+                      <a:prstDash val="solid"/>
+                      <a:round/>
+                      <a:headEnd type="none" w="med" len="med"/>
+                      <a:tailEnd type="none" w="med" len="med"/>
+                    </a:lnB>
+                  </a:tcPr>
+                </a:tc>
+                <a:tc>
+                  <a:txBody>
+                    <a:bodyPr/>
+                    <a:lstStyle/>
+                    <a:p>
+                      <a:r>
+                        <a:rPr lang="en-US" dirty="0"/>
+                        <a:t>Standard Deviation is 29.59 percent of the range</a:t>
+                      </a:r>
+                    </a:p>
+                  </a:txBody>
+                  <a:tcPr>
+                    <a:lnL w="12700" cap="flat" cmpd="sng" algn="ctr">
+                      <a:solidFill>
+                        <a:schemeClr val="tx1"/>
+                      </a:solidFill>
+                      <a:prstDash val="solid"/>
+                      <a:round/>
+                      <a:headEnd type="none" w="med" len="med"/>
+                      <a:tailEnd type="none" w="med" len="med"/>
+                    </a:lnL>
+                    <a:lnR w="12700" cap="flat" cmpd="sng" algn="ctr">
+                      <a:solidFill>
+                        <a:schemeClr val="tx1"/>
+                      </a:solidFill>
+                      <a:prstDash val="solid"/>
+                      <a:round/>
+                      <a:headEnd type="none" w="med" len="med"/>
+                      <a:tailEnd type="none" w="med" len="med"/>
+                    </a:lnR>
+                    <a:lnT w="12700" cap="flat" cmpd="sng" algn="ctr">
+                      <a:solidFill>
+                        <a:schemeClr val="tx1"/>
+                      </a:solidFill>
+                      <a:prstDash val="solid"/>
+                      <a:round/>
+                      <a:headEnd type="none" w="med" len="med"/>
+                      <a:tailEnd type="none" w="med" len="med"/>
+                    </a:lnT>
+                    <a:lnB w="12700" cap="flat" cmpd="sng" algn="ctr">
+                      <a:solidFill>
+                        <a:schemeClr val="tx1"/>
+                      </a:solidFill>
+                      <a:prstDash val="solid"/>
+                      <a:round/>
+                      <a:headEnd type="none" w="med" len="med"/>
+                      <a:tailEnd type="none" w="med" len="med"/>
+                    </a:lnB>
+                  </a:tcPr>
+                </a:tc>
+                <a:tc>
+                  <a:txBody>
+                    <a:bodyPr/>
+                    <a:lstStyle/>
+                    <a:p>
+                      <a:r>
+                        <a:rPr lang="en-US" dirty="0"/>
+                        <a:t>Standard Deviation is 29.93 percent of the range</a:t>
+                      </a:r>
+                    </a:p>
+                  </a:txBody>
+                  <a:tcPr>
+                    <a:lnL w="12700" cap="flat" cmpd="sng" algn="ctr">
+                      <a:solidFill>
+                        <a:schemeClr val="tx1"/>
+                      </a:solidFill>
+                      <a:prstDash val="solid"/>
+                      <a:round/>
+                      <a:headEnd type="none" w="med" len="med"/>
+                      <a:tailEnd type="none" w="med" len="med"/>
+                    </a:lnL>
+                    <a:lnR w="12700" cap="flat" cmpd="sng" algn="ctr">
+                      <a:solidFill>
+                        <a:schemeClr val="tx1"/>
+                      </a:solidFill>
+                      <a:prstDash val="solid"/>
+                      <a:round/>
+                      <a:headEnd type="none" w="med" len="med"/>
+                      <a:tailEnd type="none" w="med" len="med"/>
+                    </a:lnR>
+                    <a:lnT w="12700" cap="flat" cmpd="sng" algn="ctr">
+                      <a:solidFill>
+                        <a:schemeClr val="tx1"/>
+                      </a:solidFill>
+                      <a:prstDash val="solid"/>
+                      <a:round/>
+                      <a:headEnd type="none" w="med" len="med"/>
+                      <a:tailEnd type="none" w="med" len="med"/>
+                    </a:lnT>
+                    <a:lnB w="12700" cap="flat" cmpd="sng" algn="ctr">
+                      <a:solidFill>
+                        <a:schemeClr val="tx1"/>
+                      </a:solidFill>
+                      <a:prstDash val="solid"/>
+                      <a:round/>
+                      <a:headEnd type="none" w="med" len="med"/>
+                      <a:tailEnd type="none" w="med" len="med"/>
+                    </a:lnB>
+                  </a:tcPr>
+                </a:tc>
+                <a:extLst>
+                  <a:ext uri="{0D108BD9-81ED-4DB2-BD59-A6C34878D82A}">
+                    <a16:rowId xmlns:a16="http://schemas.microsoft.com/office/drawing/2014/main" val="3609830950"/>
+                  </a:ext>
+                </a:extLst>
+              </a:tr>
+              <a:tr h="808258">
+                <a:tc>
+                  <a:txBody>
+                    <a:bodyPr/>
+                    <a:lstStyle/>
+                    <a:p>
+                      <a:r>
+                        <a:rPr lang="en-US" sz="1800" b="0" i="0" kern="1200" dirty="0">
+                          <a:solidFill>
+                            <a:schemeClr val="dk1"/>
+                          </a:solidFill>
+                          <a:effectLst/>
+                          <a:latin typeface="+mn-lt"/>
+                          <a:ea typeface="+mn-ea"/>
+                          <a:cs typeface="+mn-cs"/>
+                        </a:rPr>
+                        <a:t>The minimum value is 1.46 standard deviations away from the mean</a:t>
+                      </a:r>
+                      <a:endParaRPr lang="en-US" dirty="0"/>
+                    </a:p>
+                  </a:txBody>
+                  <a:tcPr>
+                    <a:lnL w="12700" cap="flat" cmpd="sng" algn="ctr">
+                      <a:solidFill>
+                        <a:schemeClr val="tx1"/>
+                      </a:solidFill>
+                      <a:prstDash val="solid"/>
+                      <a:round/>
+                      <a:headEnd type="none" w="med" len="med"/>
+                      <a:tailEnd type="none" w="med" len="med"/>
+                    </a:lnL>
+                    <a:lnR w="12700" cap="flat" cmpd="sng" algn="ctr">
+                      <a:solidFill>
+                        <a:schemeClr val="tx1"/>
+                      </a:solidFill>
+                      <a:prstDash val="solid"/>
+                      <a:round/>
+                      <a:headEnd type="none" w="med" len="med"/>
+                      <a:tailEnd type="none" w="med" len="med"/>
+                    </a:lnR>
+                    <a:lnT w="12700" cap="flat" cmpd="sng" algn="ctr">
+                      <a:solidFill>
+                        <a:schemeClr val="tx1"/>
+                      </a:solidFill>
+                      <a:prstDash val="solid"/>
+                      <a:round/>
+                      <a:headEnd type="none" w="med" len="med"/>
+                      <a:tailEnd type="none" w="med" len="med"/>
+                    </a:lnT>
+                    <a:lnB w="12700" cap="flat" cmpd="sng" algn="ctr">
+                      <a:solidFill>
+                        <a:schemeClr val="tx1"/>
+                      </a:solidFill>
+                      <a:prstDash val="solid"/>
+                      <a:round/>
+                      <a:headEnd type="none" w="med" len="med"/>
+                      <a:tailEnd type="none" w="med" len="med"/>
+                    </a:lnB>
+                  </a:tcPr>
+                </a:tc>
+                <a:tc>
+                  <a:txBody>
+                    <a:bodyPr/>
+                    <a:lstStyle/>
+                    <a:p>
+                      <a:r>
+                        <a:rPr lang="en-US" sz="1800" b="0" i="0" kern="1200" dirty="0">
+                          <a:solidFill>
+                            <a:schemeClr val="dk1"/>
+                          </a:solidFill>
+                          <a:effectLst/>
+                          <a:latin typeface="+mn-lt"/>
+                          <a:ea typeface="+mn-ea"/>
+                          <a:cs typeface="+mn-cs"/>
+                        </a:rPr>
+                        <a:t>The minimum value is 1.49 standard deviations away from the mean</a:t>
+                      </a:r>
+                      <a:endParaRPr lang="en-US" dirty="0"/>
+                    </a:p>
+                  </a:txBody>
+                  <a:tcPr>
+                    <a:lnL w="12700" cap="flat" cmpd="sng" algn="ctr">
+                      <a:solidFill>
+                        <a:schemeClr val="tx1"/>
+                      </a:solidFill>
+                      <a:prstDash val="solid"/>
+                      <a:round/>
+                      <a:headEnd type="none" w="med" len="med"/>
+                      <a:tailEnd type="none" w="med" len="med"/>
+                    </a:lnL>
+                    <a:lnR w="12700" cap="flat" cmpd="sng" algn="ctr">
+                      <a:solidFill>
+                        <a:schemeClr val="tx1"/>
+                      </a:solidFill>
+                      <a:prstDash val="solid"/>
+                      <a:round/>
+                      <a:headEnd type="none" w="med" len="med"/>
+                      <a:tailEnd type="none" w="med" len="med"/>
+                    </a:lnR>
+                    <a:lnT w="12700" cap="flat" cmpd="sng" algn="ctr">
+                      <a:solidFill>
+                        <a:schemeClr val="tx1"/>
+                      </a:solidFill>
+                      <a:prstDash val="solid"/>
+                      <a:round/>
+                      <a:headEnd type="none" w="med" len="med"/>
+                      <a:tailEnd type="none" w="med" len="med"/>
+                    </a:lnT>
+                    <a:lnB w="12700" cap="flat" cmpd="sng" algn="ctr">
+                      <a:solidFill>
+                        <a:schemeClr val="tx1"/>
+                      </a:solidFill>
+                      <a:prstDash val="solid"/>
+                      <a:round/>
+                      <a:headEnd type="none" w="med" len="med"/>
+                      <a:tailEnd type="none" w="med" len="med"/>
+                    </a:lnB>
+                  </a:tcPr>
+                </a:tc>
+                <a:tc>
+                  <a:txBody>
+                    <a:bodyPr/>
+                    <a:lstStyle/>
+                    <a:p>
+                      <a:r>
+                        <a:rPr lang="en-US" dirty="0"/>
+                        <a:t>T</a:t>
+                      </a:r>
+                      <a:r>
+                        <a:rPr lang="en-US" sz="1800" b="0" i="0" kern="1200" dirty="0">
+                          <a:solidFill>
+                            <a:schemeClr val="dk1"/>
+                          </a:solidFill>
+                          <a:effectLst/>
+                          <a:latin typeface="+mn-lt"/>
+                          <a:ea typeface="+mn-ea"/>
+                          <a:cs typeface="+mn-cs"/>
+                        </a:rPr>
+                        <a:t>he minimum value is 1.91 standard deviations away from the mean</a:t>
+                      </a:r>
+                      <a:endParaRPr lang="en-US" dirty="0"/>
+                    </a:p>
+                  </a:txBody>
+                  <a:tcPr>
+                    <a:lnL w="12700" cap="flat" cmpd="sng" algn="ctr">
+                      <a:solidFill>
+                        <a:schemeClr val="tx1"/>
+                      </a:solidFill>
+                      <a:prstDash val="solid"/>
+                      <a:round/>
+                      <a:headEnd type="none" w="med" len="med"/>
+                      <a:tailEnd type="none" w="med" len="med"/>
+                    </a:lnL>
+                    <a:lnR w="12700" cap="flat" cmpd="sng" algn="ctr">
+                      <a:solidFill>
+                        <a:schemeClr val="tx1"/>
+                      </a:solidFill>
+                      <a:prstDash val="solid"/>
+                      <a:round/>
+                      <a:headEnd type="none" w="med" len="med"/>
+                      <a:tailEnd type="none" w="med" len="med"/>
+                    </a:lnR>
+                    <a:lnT w="12700" cap="flat" cmpd="sng" algn="ctr">
+                      <a:solidFill>
+                        <a:schemeClr val="tx1"/>
+                      </a:solidFill>
+                      <a:prstDash val="solid"/>
+                      <a:round/>
+                      <a:headEnd type="none" w="med" len="med"/>
+                      <a:tailEnd type="none" w="med" len="med"/>
+                    </a:lnT>
+                    <a:lnB w="12700" cap="flat" cmpd="sng" algn="ctr">
+                      <a:solidFill>
+                        <a:schemeClr val="tx1"/>
+                      </a:solidFill>
+                      <a:prstDash val="solid"/>
+                      <a:round/>
+                      <a:headEnd type="none" w="med" len="med"/>
+                      <a:tailEnd type="none" w="med" len="med"/>
+                    </a:lnB>
+                  </a:tcPr>
+                </a:tc>
+                <a:tc>
+                  <a:txBody>
+                    <a:bodyPr/>
+                    <a:lstStyle/>
+                    <a:p>
+                      <a:r>
+                        <a:rPr lang="en-US" dirty="0"/>
+                        <a:t>T</a:t>
+                      </a:r>
+                      <a:r>
+                        <a:rPr lang="en-US" sz="1800" b="0" i="0" kern="1200" dirty="0">
+                          <a:solidFill>
+                            <a:schemeClr val="dk1"/>
+                          </a:solidFill>
+                          <a:effectLst/>
+                          <a:latin typeface="+mn-lt"/>
+                          <a:ea typeface="+mn-ea"/>
+                          <a:cs typeface="+mn-cs"/>
+                        </a:rPr>
+                        <a:t>he minimum value is 2.12 standard deviations away from the mean</a:t>
+                      </a:r>
+                      <a:endParaRPr lang="en-US" dirty="0"/>
+                    </a:p>
+                  </a:txBody>
+                  <a:tcPr>
+                    <a:lnL w="12700" cap="flat" cmpd="sng" algn="ctr">
+                      <a:solidFill>
+                        <a:schemeClr val="tx1"/>
+                      </a:solidFill>
+                      <a:prstDash val="solid"/>
+                      <a:round/>
+                      <a:headEnd type="none" w="med" len="med"/>
+                      <a:tailEnd type="none" w="med" len="med"/>
+                    </a:lnL>
+                    <a:lnR w="12700" cap="flat" cmpd="sng" algn="ctr">
+                      <a:solidFill>
+                        <a:schemeClr val="tx1"/>
+                      </a:solidFill>
+                      <a:prstDash val="solid"/>
+                      <a:round/>
+                      <a:headEnd type="none" w="med" len="med"/>
+                      <a:tailEnd type="none" w="med" len="med"/>
+                    </a:lnR>
+                    <a:lnT w="12700" cap="flat" cmpd="sng" algn="ctr">
+                      <a:solidFill>
+                        <a:schemeClr val="tx1"/>
+                      </a:solidFill>
+                      <a:prstDash val="solid"/>
+                      <a:round/>
+                      <a:headEnd type="none" w="med" len="med"/>
+                      <a:tailEnd type="none" w="med" len="med"/>
+                    </a:lnT>
+                    <a:lnB w="12700" cap="flat" cmpd="sng" algn="ctr">
+                      <a:solidFill>
+                        <a:schemeClr val="tx1"/>
+                      </a:solidFill>
+                      <a:prstDash val="solid"/>
+                      <a:round/>
+                      <a:headEnd type="none" w="med" len="med"/>
+                      <a:tailEnd type="none" w="med" len="med"/>
+                    </a:lnB>
+                  </a:tcPr>
+                </a:tc>
+                <a:tc>
+                  <a:txBody>
+                    <a:bodyPr/>
+                    <a:lstStyle/>
+                    <a:p>
+                      <a:r>
+                        <a:rPr lang="en-US" dirty="0"/>
+                        <a:t>T</a:t>
+                      </a:r>
+                      <a:r>
+                        <a:rPr lang="en-US" sz="1800" b="0" i="0" kern="1200" dirty="0">
+                          <a:solidFill>
+                            <a:schemeClr val="dk1"/>
+                          </a:solidFill>
+                          <a:effectLst/>
+                          <a:latin typeface="+mn-lt"/>
+                          <a:ea typeface="+mn-ea"/>
+                          <a:cs typeface="+mn-cs"/>
+                        </a:rPr>
+                        <a:t>he minimum value is 1.82 standard deviations away from the mean</a:t>
+                      </a:r>
+                      <a:endParaRPr lang="en-US" dirty="0"/>
+                    </a:p>
+                  </a:txBody>
+                  <a:tcPr>
+                    <a:lnL w="12700" cap="flat" cmpd="sng" algn="ctr">
+                      <a:solidFill>
+                        <a:schemeClr val="tx1"/>
+                      </a:solidFill>
+                      <a:prstDash val="solid"/>
+                      <a:round/>
+                      <a:headEnd type="none" w="med" len="med"/>
+                      <a:tailEnd type="none" w="med" len="med"/>
+                    </a:lnL>
+                    <a:lnR w="12700" cap="flat" cmpd="sng" algn="ctr">
+                      <a:solidFill>
+                        <a:schemeClr val="tx1"/>
+                      </a:solidFill>
+                      <a:prstDash val="solid"/>
+                      <a:round/>
+                      <a:headEnd type="none" w="med" len="med"/>
+                      <a:tailEnd type="none" w="med" len="med"/>
+                    </a:lnR>
+                    <a:lnT w="12700" cap="flat" cmpd="sng" algn="ctr">
+                      <a:solidFill>
+                        <a:schemeClr val="tx1"/>
+                      </a:solidFill>
+                      <a:prstDash val="solid"/>
+                      <a:round/>
+                      <a:headEnd type="none" w="med" len="med"/>
+                      <a:tailEnd type="none" w="med" len="med"/>
+                    </a:lnT>
+                    <a:lnB w="12700" cap="flat" cmpd="sng" algn="ctr">
+                      <a:solidFill>
+                        <a:schemeClr val="tx1"/>
+                      </a:solidFill>
+                      <a:prstDash val="solid"/>
+                      <a:round/>
+                      <a:headEnd type="none" w="med" len="med"/>
+                      <a:tailEnd type="none" w="med" len="med"/>
+                    </a:lnB>
+                  </a:tcPr>
+                </a:tc>
+                <a:extLst>
+                  <a:ext uri="{0D108BD9-81ED-4DB2-BD59-A6C34878D82A}">
+                    <a16:rowId xmlns:a16="http://schemas.microsoft.com/office/drawing/2014/main" val="4286265179"/>
+                  </a:ext>
+                </a:extLst>
+              </a:tr>
+              <a:tr h="808258">
+                <a:tc>
+                  <a:txBody>
+                    <a:bodyPr/>
+                    <a:lstStyle/>
+                    <a:p>
+                      <a:r>
+                        <a:rPr lang="en-US" dirty="0"/>
+                        <a:t>T</a:t>
+                      </a:r>
+                      <a:r>
+                        <a:rPr lang="en-US" sz="1800" b="0" i="0" kern="1200" dirty="0">
+                          <a:solidFill>
+                            <a:schemeClr val="dk1"/>
+                          </a:solidFill>
+                          <a:effectLst/>
+                          <a:latin typeface="+mn-lt"/>
+                          <a:ea typeface="+mn-ea"/>
+                          <a:cs typeface="+mn-cs"/>
+                        </a:rPr>
+                        <a:t>he maximum value is 1.75 standard deviations away from the mean</a:t>
+                      </a:r>
+                      <a:endParaRPr lang="en-US" dirty="0"/>
+                    </a:p>
+                  </a:txBody>
+                  <a:tcPr>
+                    <a:lnL w="12700" cap="flat" cmpd="sng" algn="ctr">
+                      <a:solidFill>
+                        <a:schemeClr val="tx1"/>
+                      </a:solidFill>
+                      <a:prstDash val="solid"/>
+                      <a:round/>
+                      <a:headEnd type="none" w="med" len="med"/>
+                      <a:tailEnd type="none" w="med" len="med"/>
+                    </a:lnL>
+                    <a:lnR w="12700" cap="flat" cmpd="sng" algn="ctr">
+                      <a:solidFill>
+                        <a:schemeClr val="tx1"/>
+                      </a:solidFill>
+                      <a:prstDash val="solid"/>
+                      <a:round/>
+                      <a:headEnd type="none" w="med" len="med"/>
+                      <a:tailEnd type="none" w="med" len="med"/>
+                    </a:lnR>
+                    <a:lnT w="12700" cap="flat" cmpd="sng" algn="ctr">
+                      <a:solidFill>
+                        <a:schemeClr val="tx1"/>
+                      </a:solidFill>
+                      <a:prstDash val="solid"/>
+                      <a:round/>
+                      <a:headEnd type="none" w="med" len="med"/>
+                      <a:tailEnd type="none" w="med" len="med"/>
+                    </a:lnT>
+                    <a:lnB w="12700" cap="flat" cmpd="sng" algn="ctr">
+                      <a:solidFill>
+                        <a:schemeClr val="tx1"/>
+                      </a:solidFill>
+                      <a:prstDash val="solid"/>
+                      <a:round/>
+                      <a:headEnd type="none" w="med" len="med"/>
+                      <a:tailEnd type="none" w="med" len="med"/>
+                    </a:lnB>
+                  </a:tcPr>
+                </a:tc>
+                <a:tc>
+                  <a:txBody>
+                    <a:bodyPr/>
+                    <a:lstStyle/>
+                    <a:p>
+                      <a:r>
+                        <a:rPr lang="en-US" dirty="0"/>
+                        <a:t>T</a:t>
+                      </a:r>
+                      <a:r>
+                        <a:rPr lang="en-US" sz="1800" b="0" i="0" kern="1200" dirty="0">
+                          <a:solidFill>
+                            <a:schemeClr val="dk1"/>
+                          </a:solidFill>
+                          <a:effectLst/>
+                          <a:latin typeface="+mn-lt"/>
+                          <a:ea typeface="+mn-ea"/>
+                          <a:cs typeface="+mn-cs"/>
+                        </a:rPr>
+                        <a:t>he maximum value is 1.60 standard deviations away from the mean</a:t>
+                      </a:r>
+                      <a:endParaRPr lang="en-US" dirty="0"/>
+                    </a:p>
+                  </a:txBody>
+                  <a:tcPr>
+                    <a:lnL w="12700" cap="flat" cmpd="sng" algn="ctr">
+                      <a:solidFill>
+                        <a:schemeClr val="tx1"/>
+                      </a:solidFill>
+                      <a:prstDash val="solid"/>
+                      <a:round/>
+                      <a:headEnd type="none" w="med" len="med"/>
+                      <a:tailEnd type="none" w="med" len="med"/>
+                    </a:lnL>
+                    <a:lnR w="12700" cap="flat" cmpd="sng" algn="ctr">
+                      <a:solidFill>
+                        <a:schemeClr val="tx1"/>
+                      </a:solidFill>
+                      <a:prstDash val="solid"/>
+                      <a:round/>
+                      <a:headEnd type="none" w="med" len="med"/>
+                      <a:tailEnd type="none" w="med" len="med"/>
+                    </a:lnR>
+                    <a:lnT w="12700" cap="flat" cmpd="sng" algn="ctr">
+                      <a:solidFill>
+                        <a:schemeClr val="tx1"/>
+                      </a:solidFill>
+                      <a:prstDash val="solid"/>
+                      <a:round/>
+                      <a:headEnd type="none" w="med" len="med"/>
+                      <a:tailEnd type="none" w="med" len="med"/>
+                    </a:lnT>
+                    <a:lnB w="12700" cap="flat" cmpd="sng" algn="ctr">
+                      <a:solidFill>
+                        <a:schemeClr val="tx1"/>
+                      </a:solidFill>
+                      <a:prstDash val="solid"/>
+                      <a:round/>
+                      <a:headEnd type="none" w="med" len="med"/>
+                      <a:tailEnd type="none" w="med" len="med"/>
+                    </a:lnB>
+                  </a:tcPr>
+                </a:tc>
+                <a:tc>
+                  <a:txBody>
+                    <a:bodyPr/>
+                    <a:lstStyle/>
+                    <a:p>
+                      <a:r>
+                        <a:rPr lang="en-US" sz="1800" b="0" i="0" kern="1200" dirty="0">
+                          <a:solidFill>
+                            <a:schemeClr val="dk1"/>
+                          </a:solidFill>
+                          <a:effectLst/>
+                          <a:latin typeface="+mn-lt"/>
+                          <a:ea typeface="+mn-ea"/>
+                          <a:cs typeface="+mn-cs"/>
+                        </a:rPr>
+                        <a:t>The maximum value is 1.86 standard deviations away from the mean</a:t>
+                      </a:r>
+                      <a:endParaRPr lang="en-US" dirty="0"/>
+                    </a:p>
+                  </a:txBody>
+                  <a:tcPr>
+                    <a:lnL w="12700" cap="flat" cmpd="sng" algn="ctr">
+                      <a:solidFill>
+                        <a:schemeClr val="tx1"/>
+                      </a:solidFill>
+                      <a:prstDash val="solid"/>
+                      <a:round/>
+                      <a:headEnd type="none" w="med" len="med"/>
+                      <a:tailEnd type="none" w="med" len="med"/>
+                    </a:lnL>
+                    <a:lnR w="12700" cap="flat" cmpd="sng" algn="ctr">
+                      <a:solidFill>
+                        <a:schemeClr val="tx1"/>
+                      </a:solidFill>
+                      <a:prstDash val="solid"/>
+                      <a:round/>
+                      <a:headEnd type="none" w="med" len="med"/>
+                      <a:tailEnd type="none" w="med" len="med"/>
+                    </a:lnR>
+                    <a:lnT w="12700" cap="flat" cmpd="sng" algn="ctr">
+                      <a:solidFill>
+                        <a:schemeClr val="tx1"/>
+                      </a:solidFill>
+                      <a:prstDash val="solid"/>
+                      <a:round/>
+                      <a:headEnd type="none" w="med" len="med"/>
+                      <a:tailEnd type="none" w="med" len="med"/>
+                    </a:lnT>
+                    <a:lnB w="12700" cap="flat" cmpd="sng" algn="ctr">
+                      <a:solidFill>
+                        <a:schemeClr val="tx1"/>
+                      </a:solidFill>
+                      <a:prstDash val="solid"/>
+                      <a:round/>
+                      <a:headEnd type="none" w="med" len="med"/>
+                      <a:tailEnd type="none" w="med" len="med"/>
+                    </a:lnB>
+                  </a:tcPr>
+                </a:tc>
+                <a:tc>
+                  <a:txBody>
+                    <a:bodyPr/>
+                    <a:lstStyle/>
+                    <a:p>
+                      <a:r>
+                        <a:rPr lang="en-US" dirty="0"/>
+                        <a:t>T</a:t>
+                      </a:r>
+                      <a:r>
+                        <a:rPr lang="en-US" sz="1800" b="0" i="0" kern="1200" dirty="0">
+                          <a:solidFill>
+                            <a:schemeClr val="dk1"/>
+                          </a:solidFill>
+                          <a:effectLst/>
+                          <a:latin typeface="+mn-lt"/>
+                          <a:ea typeface="+mn-ea"/>
+                          <a:cs typeface="+mn-cs"/>
+                        </a:rPr>
+                        <a:t>he maximum value is 1.25 standard deviations away from the mean</a:t>
+                      </a:r>
+                      <a:endParaRPr lang="en-US" dirty="0"/>
+                    </a:p>
+                  </a:txBody>
+                  <a:tcPr>
+                    <a:lnL w="12700" cap="flat" cmpd="sng" algn="ctr">
+                      <a:solidFill>
+                        <a:schemeClr val="tx1"/>
+                      </a:solidFill>
+                      <a:prstDash val="solid"/>
+                      <a:round/>
+                      <a:headEnd type="none" w="med" len="med"/>
+                      <a:tailEnd type="none" w="med" len="med"/>
+                    </a:lnL>
+                    <a:lnR w="12700" cap="flat" cmpd="sng" algn="ctr">
+                      <a:solidFill>
+                        <a:schemeClr val="tx1"/>
+                      </a:solidFill>
+                      <a:prstDash val="solid"/>
+                      <a:round/>
+                      <a:headEnd type="none" w="med" len="med"/>
+                      <a:tailEnd type="none" w="med" len="med"/>
+                    </a:lnR>
+                    <a:lnT w="12700" cap="flat" cmpd="sng" algn="ctr">
+                      <a:solidFill>
+                        <a:schemeClr val="tx1"/>
+                      </a:solidFill>
+                      <a:prstDash val="solid"/>
+                      <a:round/>
+                      <a:headEnd type="none" w="med" len="med"/>
+                      <a:tailEnd type="none" w="med" len="med"/>
+                    </a:lnT>
+                    <a:lnB w="12700" cap="flat" cmpd="sng" algn="ctr">
+                      <a:solidFill>
+                        <a:schemeClr val="tx1"/>
+                      </a:solidFill>
+                      <a:prstDash val="solid"/>
+                      <a:round/>
+                      <a:headEnd type="none" w="med" len="med"/>
+                      <a:tailEnd type="none" w="med" len="med"/>
+                    </a:lnB>
+                  </a:tcPr>
+                </a:tc>
+                <a:tc>
+                  <a:txBody>
+                    <a:bodyPr/>
+                    <a:lstStyle/>
+                    <a:p>
+                      <a:r>
+                        <a:rPr lang="en-US"/>
+                        <a:t>T</a:t>
+                      </a:r>
+                      <a:r>
+                        <a:rPr lang="en-US" sz="1800" b="0" i="0" kern="1200">
+                          <a:solidFill>
+                            <a:schemeClr val="dk1"/>
+                          </a:solidFill>
+                          <a:effectLst/>
+                          <a:latin typeface="+mn-lt"/>
+                          <a:ea typeface="+mn-ea"/>
+                          <a:cs typeface="+mn-cs"/>
+                        </a:rPr>
+                        <a:t>he maximum value is 1.53 standard deviations away from the mean</a:t>
+                      </a:r>
+                      <a:endParaRPr lang="en-US" dirty="0"/>
+                    </a:p>
+                  </a:txBody>
+                  <a:tcPr>
+                    <a:lnL w="12700" cap="flat" cmpd="sng" algn="ctr">
+                      <a:solidFill>
+                        <a:schemeClr val="tx1"/>
+                      </a:solidFill>
+                      <a:prstDash val="solid"/>
+                      <a:round/>
+                      <a:headEnd type="none" w="med" len="med"/>
+                      <a:tailEnd type="none" w="med" len="med"/>
+                    </a:lnL>
+                    <a:lnR w="12700" cap="flat" cmpd="sng" algn="ctr">
+                      <a:solidFill>
+                        <a:schemeClr val="tx1"/>
+                      </a:solidFill>
+                      <a:prstDash val="solid"/>
+                      <a:round/>
+                      <a:headEnd type="none" w="med" len="med"/>
+                      <a:tailEnd type="none" w="med" len="med"/>
+                    </a:lnR>
+                    <a:lnT w="12700" cap="flat" cmpd="sng" algn="ctr">
+                      <a:solidFill>
+                        <a:schemeClr val="tx1"/>
+                      </a:solidFill>
+                      <a:prstDash val="solid"/>
+                      <a:round/>
+                      <a:headEnd type="none" w="med" len="med"/>
+                      <a:tailEnd type="none" w="med" len="med"/>
+                    </a:lnT>
+                    <a:lnB w="12700" cap="flat" cmpd="sng" algn="ctr">
+                      <a:solidFill>
+                        <a:schemeClr val="tx1"/>
+                      </a:solidFill>
+                      <a:prstDash val="solid"/>
+                      <a:round/>
+                      <a:headEnd type="none" w="med" len="med"/>
+                      <a:tailEnd type="none" w="med" len="med"/>
+                    </a:lnB>
+                  </a:tcPr>
+                </a:tc>
+                <a:extLst>
+                  <a:ext uri="{0D108BD9-81ED-4DB2-BD59-A6C34878D82A}">
+                    <a16:rowId xmlns:a16="http://schemas.microsoft.com/office/drawing/2014/main" val="1305601569"/>
+                  </a:ext>
+                </a:extLst>
+              </a:tr>
+            </a:tbl>
+          </a:graphicData>
+        </a:graphic>
+      </p:graphicFrame>
     </p:spTree>
   </p:cSld>
   <p:clrMapOvr>

</xml_diff>

<commit_message>
Added some information to poster
Some stuff in PRNG section and conclusion
</commit_message>
<xml_diff>
--- a/PRNG_PosterRoughDraft.pptx
+++ b/PRNG_PosterRoughDraft.pptx
@@ -2505,8 +2505,8 @@
         </p:nvSpPr>
         <p:spPr>
           <a:xfrm>
-            <a:off x="10093320" y="3225960"/>
-            <a:ext cx="21976920" cy="5028840"/>
+            <a:off x="10093320" y="3225959"/>
+            <a:ext cx="21976920" cy="5777535"/>
           </a:xfrm>
           <a:prstGeom prst="rect">
             <a:avLst/>
@@ -2542,7 +2542,7 @@
         </p:nvSpPr>
         <p:spPr>
           <a:xfrm>
-            <a:off x="10093320" y="8454960"/>
+            <a:off x="10093320" y="9220823"/>
             <a:ext cx="21976920" cy="5028840"/>
           </a:xfrm>
           <a:prstGeom prst="rect">
@@ -2579,8 +2579,8 @@
         </p:nvSpPr>
         <p:spPr>
           <a:xfrm>
-            <a:off x="10093320" y="13684320"/>
-            <a:ext cx="21976920" cy="5028840"/>
+            <a:off x="9987120" y="15100846"/>
+            <a:ext cx="21976920" cy="3614617"/>
           </a:xfrm>
           <a:prstGeom prst="rect">
             <a:avLst/>
@@ -2732,7 +2732,7 @@
         </p:nvSpPr>
         <p:spPr>
           <a:xfrm>
-            <a:off x="10179000" y="8512200"/>
+            <a:off x="10108692" y="9203655"/>
             <a:ext cx="21813480" cy="771120"/>
           </a:xfrm>
           <a:prstGeom prst="rect">
@@ -2775,7 +2775,7 @@
               </a:lnSpc>
             </a:pPr>
             <a:r>
-              <a:rPr lang="en-US" sz="4050" b="0" strike="noStrike" spc="-1">
+              <a:rPr lang="en-US" sz="4050" b="0" strike="noStrike" spc="-1" dirty="0">
                 <a:solidFill>
                   <a:srgbClr val="000000"/>
                 </a:solidFill>
@@ -2789,7 +2789,7 @@
               </a:rPr>
               <a:t>Findings</a:t>
             </a:r>
-            <a:endParaRPr lang="en-US" sz="1800" b="0" strike="noStrike" spc="-1">
+            <a:endParaRPr lang="en-US" sz="1800" b="0" strike="noStrike" spc="-1" dirty="0">
               <a:solidFill>
                 <a:srgbClr val="000000"/>
               </a:solidFill>
@@ -2811,7 +2811,7 @@
         </p:nvSpPr>
         <p:spPr>
           <a:xfrm>
-            <a:off x="10179000" y="13741560"/>
+            <a:off x="9987120" y="15129407"/>
             <a:ext cx="21813480" cy="771120"/>
           </a:xfrm>
           <a:prstGeom prst="rect">
@@ -2854,7 +2854,7 @@
               </a:lnSpc>
             </a:pPr>
             <a:r>
-              <a:rPr lang="en-US" sz="4050" b="0" strike="noStrike" spc="-1">
+              <a:rPr lang="en-US" sz="4050" b="0" strike="noStrike" spc="-1" dirty="0">
                 <a:solidFill>
                   <a:srgbClr val="000000"/>
                 </a:solidFill>
@@ -2868,7 +2868,7 @@
               </a:rPr>
               <a:t>Conclusion and Future Work</a:t>
             </a:r>
-            <a:endParaRPr lang="en-US" sz="1800" b="0" strike="noStrike" spc="-1">
+            <a:endParaRPr lang="en-US" sz="1800" b="0" strike="noStrike" spc="-1" dirty="0">
               <a:solidFill>
                 <a:srgbClr val="000000"/>
               </a:solidFill>
@@ -3079,7 +3079,7 @@
         <p:spPr>
           <a:xfrm>
             <a:off x="671400" y="19762200"/>
-            <a:ext cx="25482240" cy="1565280"/>
+            <a:ext cx="9078840" cy="1565280"/>
           </a:xfrm>
           <a:prstGeom prst="rect">
             <a:avLst/>
@@ -3111,7 +3111,7 @@
               </a:lnSpc>
             </a:pPr>
             <a:r>
-              <a:rPr lang="en-US" sz="1400" b="0" strike="noStrike" spc="-1">
+              <a:rPr lang="en-US" sz="1400" b="0" strike="noStrike" spc="-1" dirty="0">
                 <a:solidFill>
                   <a:srgbClr val="000000"/>
                 </a:solidFill>
@@ -3125,7 +3125,7 @@
               </a:rPr>
               <a:t>Will Kenton – https://www.incestopedia.com/terms/m/montecarlosimulation.asp </a:t>
             </a:r>
-            <a:endParaRPr lang="en-US" sz="1800" b="0" strike="noStrike" spc="-1">
+            <a:endParaRPr lang="en-US" sz="1800" b="0" strike="noStrike" spc="-1" dirty="0">
               <a:solidFill>
                 <a:srgbClr val="000000"/>
               </a:solidFill>
@@ -3144,7 +3144,7 @@
               </a:lnSpc>
             </a:pPr>
             <a:r>
-              <a:rPr lang="en-US" sz="1400" b="0" strike="noStrike" spc="-1">
+              <a:rPr lang="en-US" sz="1400" b="0" strike="noStrike" spc="-1" dirty="0">
                 <a:solidFill>
                   <a:srgbClr val="000000"/>
                 </a:solidFill>
@@ -3158,7 +3158,7 @@
               </a:rPr>
               <a:t>Optimization Of the Time-dependent Traveling Salesman Problem with Monte Carlo Methods </a:t>
             </a:r>
-            <a:endParaRPr lang="en-US" sz="1800" b="0" strike="noStrike" spc="-1">
+            <a:endParaRPr lang="en-US" sz="1800" b="0" strike="noStrike" spc="-1" dirty="0">
               <a:solidFill>
                 <a:srgbClr val="000000"/>
               </a:solidFill>
@@ -3177,7 +3177,7 @@
               </a:lnSpc>
             </a:pPr>
             <a:r>
-              <a:rPr lang="en-US" sz="1400" b="0" strike="noStrike" spc="-1">
+              <a:rPr lang="en-US" sz="1400" b="0" strike="noStrike" spc="-1" dirty="0">
                 <a:solidFill>
                   <a:srgbClr val="000000"/>
                 </a:solidFill>
@@ -3189,9 +3189,69 @@
                 <a:latin typeface="Cambria"/>
                 <a:ea typeface="American Typewriter Condensed"/>
               </a:rPr>
-              <a:t>	J Bentner-G Bauer-G Obermair-I Morgenstern-J Schneider –  </a:t>
+              <a:t>	J </a:t>
             </a:r>
-            <a:endParaRPr lang="en-US" sz="1800" b="0" strike="noStrike" spc="-1">
+            <a:r>
+              <a:rPr lang="en-US" sz="1400" b="0" strike="noStrike" spc="-1" dirty="0" err="1">
+                <a:solidFill>
+                  <a:srgbClr val="000000"/>
+                </a:solidFill>
+                <a:uFill>
+                  <a:solidFill>
+                    <a:srgbClr val="FFFFFF"/>
+                  </a:solidFill>
+                </a:uFill>
+                <a:latin typeface="Cambria"/>
+                <a:ea typeface="American Typewriter Condensed"/>
+              </a:rPr>
+              <a:t>Bentner</a:t>
+            </a:r>
+            <a:r>
+              <a:rPr lang="en-US" sz="1400" b="0" strike="noStrike" spc="-1" dirty="0">
+                <a:solidFill>
+                  <a:srgbClr val="000000"/>
+                </a:solidFill>
+                <a:uFill>
+                  <a:solidFill>
+                    <a:srgbClr val="FFFFFF"/>
+                  </a:solidFill>
+                </a:uFill>
+                <a:latin typeface="Cambria"/>
+                <a:ea typeface="American Typewriter Condensed"/>
+              </a:rPr>
+              <a:t>-G Bauer-G </a:t>
+            </a:r>
+            <a:r>
+              <a:rPr lang="en-US" sz="1400" b="0" strike="noStrike" spc="-1" dirty="0" err="1">
+                <a:solidFill>
+                  <a:srgbClr val="000000"/>
+                </a:solidFill>
+                <a:uFill>
+                  <a:solidFill>
+                    <a:srgbClr val="FFFFFF"/>
+                  </a:solidFill>
+                </a:uFill>
+                <a:latin typeface="Cambria"/>
+                <a:ea typeface="American Typewriter Condensed"/>
+              </a:rPr>
+              <a:t>Obermair</a:t>
+            </a:r>
+            <a:r>
+              <a:rPr lang="en-US" sz="1400" b="0" strike="noStrike" spc="-1" dirty="0">
+                <a:solidFill>
+                  <a:srgbClr val="000000"/>
+                </a:solidFill>
+                <a:uFill>
+                  <a:solidFill>
+                    <a:srgbClr val="FFFFFF"/>
+                  </a:solidFill>
+                </a:uFill>
+                <a:latin typeface="Cambria"/>
+                <a:ea typeface="American Typewriter Condensed"/>
+              </a:rPr>
+              <a:t>-I Morgenstern-J Schneider –  </a:t>
+            </a:r>
+            <a:endParaRPr lang="en-US" sz="1800" b="0" strike="noStrike" spc="-1" dirty="0">
               <a:solidFill>
                 <a:srgbClr val="000000"/>
               </a:solidFill>
@@ -3210,7 +3270,7 @@
               </a:lnSpc>
             </a:pPr>
             <a:r>
-              <a:rPr lang="en-US" sz="1400" b="0" strike="noStrike" spc="-1">
+              <a:rPr lang="en-US" sz="1400" b="0" strike="noStrike" spc="-1" dirty="0">
                 <a:solidFill>
                   <a:srgbClr val="000000"/>
                 </a:solidFill>
@@ -3224,7 +3284,7 @@
               </a:rPr>
               <a:t>	https/://www.ncbi.nlm.nhi.gov/pubmed/115580476 </a:t>
             </a:r>
-            <a:endParaRPr lang="en-US" sz="1800" b="0" strike="noStrike" spc="-1">
+            <a:endParaRPr lang="en-US" sz="1800" b="0" strike="noStrike" spc="-1" dirty="0">
               <a:solidFill>
                 <a:srgbClr val="000000"/>
               </a:solidFill>
@@ -3243,7 +3303,7 @@
               </a:lnSpc>
             </a:pPr>
             <a:r>
-              <a:rPr lang="en-US" sz="1400" b="0" strike="noStrike" spc="-1">
+              <a:rPr lang="en-US" sz="1400" b="0" strike="noStrike" spc="-1" dirty="0">
                 <a:solidFill>
                   <a:srgbClr val="000000"/>
                 </a:solidFill>
@@ -3257,7 +3317,7 @@
               </a:rPr>
               <a:t>Monte Carlo Simulation </a:t>
             </a:r>
-            <a:endParaRPr lang="en-US" sz="1800" b="0" strike="noStrike" spc="-1">
+            <a:endParaRPr lang="en-US" sz="1800" b="0" strike="noStrike" spc="-1" dirty="0">
               <a:solidFill>
                 <a:srgbClr val="000000"/>
               </a:solidFill>
@@ -3276,7 +3336,7 @@
               </a:lnSpc>
             </a:pPr>
             <a:r>
-              <a:rPr lang="en-US" sz="1400" b="0" strike="noStrike" spc="-1">
+              <a:rPr lang="en-US" sz="1400" b="0" strike="noStrike" spc="-1" dirty="0">
                 <a:solidFill>
                   <a:srgbClr val="000000"/>
                 </a:solidFill>
@@ -3290,7 +3350,7 @@
               </a:rPr>
               <a:t> 	Michael Asbury - https://www.nasa.gov/centers/ivv/jstar/monte_carlo.html Vol 1. 1978</a:t>
             </a:r>
-            <a:endParaRPr lang="en-US" sz="1800" b="0" strike="noStrike" spc="-1">
+            <a:endParaRPr lang="en-US" sz="1800" b="0" strike="noStrike" spc="-1" dirty="0">
               <a:solidFill>
                 <a:srgbClr val="000000"/>
               </a:solidFill>
@@ -3313,7 +3373,7 @@
         <p:spPr>
           <a:xfrm>
             <a:off x="10436400" y="4197240"/>
-            <a:ext cx="12459960" cy="2692080"/>
+            <a:ext cx="16074720" cy="2692080"/>
           </a:xfrm>
           <a:prstGeom prst="rect">
             <a:avLst/>
@@ -3345,7 +3405,7 @@
               </a:lnSpc>
             </a:pPr>
             <a:r>
-              <a:rPr lang="en-US" sz="2250" b="0" strike="noStrike" spc="-1" dirty="0">
+              <a:rPr lang="en-US" sz="2250" spc="-1" dirty="0" smtClean="0">
                 <a:solidFill>
                   <a:srgbClr val="000000"/>
                 </a:solidFill>
@@ -3357,18 +3417,19 @@
                 <a:latin typeface="Cambria"/>
                 <a:ea typeface="American Typewriter"/>
               </a:rPr>
-              <a:t>Middle-Square Method: Brief explanation of what it does, and what the parallelizing it should improve</a:t>
+              <a:t>For the purposes of our experimentation, we selected and parallelized three Pseudo-Random Number Generation algorithms with varying applications and restrictions. Our intention is to explore the benefits and drawbacks of applying parallelism to pseudo-random number generation, with focus on generating a useful series of numbers for Monte Carlo simulations. Our three methods are as follows;</a:t>
             </a:r>
-            <a:endParaRPr lang="en-US" sz="1800" b="0" strike="noStrike" spc="-1" dirty="0">
-              <a:solidFill>
-                <a:srgbClr val="000000"/>
-              </a:solidFill>
-              <a:uFill>
-                <a:solidFill>
-                  <a:srgbClr val="FFFFFF"/>
-                </a:solidFill>
-              </a:uFill>
-              <a:latin typeface="Arial"/>
+            <a:endParaRPr lang="en-US" sz="2250" b="0" strike="noStrike" spc="-1" dirty="0" smtClean="0">
+              <a:solidFill>
+                <a:srgbClr val="000000"/>
+              </a:solidFill>
+              <a:uFill>
+                <a:solidFill>
+                  <a:srgbClr val="FFFFFF"/>
+                </a:solidFill>
+              </a:uFill>
+              <a:latin typeface="Cambria"/>
+              <a:ea typeface="American Typewriter"/>
             </a:endParaRPr>
           </a:p>
           <a:p>
@@ -3377,16 +3438,17 @@
                 <a:spcPct val="100000"/>
               </a:lnSpc>
             </a:pPr>
-            <a:endParaRPr lang="en-US" sz="1800" b="0" strike="noStrike" spc="-1" dirty="0">
-              <a:solidFill>
-                <a:srgbClr val="000000"/>
-              </a:solidFill>
-              <a:uFill>
-                <a:solidFill>
-                  <a:srgbClr val="FFFFFF"/>
-                </a:solidFill>
-              </a:uFill>
-              <a:latin typeface="Arial"/>
+            <a:endParaRPr lang="en-US" sz="2250" b="0" strike="noStrike" spc="-1" dirty="0" smtClean="0">
+              <a:solidFill>
+                <a:srgbClr val="000000"/>
+              </a:solidFill>
+              <a:uFill>
+                <a:solidFill>
+                  <a:srgbClr val="FFFFFF"/>
+                </a:solidFill>
+              </a:uFill>
+              <a:latin typeface="Cambria"/>
+              <a:ea typeface="American Typewriter"/>
             </a:endParaRPr>
           </a:p>
           <a:p>
@@ -3396,7 +3458,7 @@
               </a:lnSpc>
             </a:pPr>
             <a:r>
-              <a:rPr lang="en-US" sz="2250" b="0" strike="noStrike" spc="-1" dirty="0">
+              <a:rPr lang="en-US" sz="2250" b="0" strike="noStrike" spc="-1" dirty="0" smtClean="0">
                 <a:solidFill>
                   <a:srgbClr val="000000"/>
                 </a:solidFill>
@@ -3408,18 +3470,124 @@
                 <a:latin typeface="Cambria"/>
                 <a:ea typeface="American Typewriter"/>
               </a:rPr>
-              <a:t>Linear Congruential Generator : Brief explanation of what it does, and what the parallelizing it should improve</a:t>
+              <a:t>Middle-Square </a:t>
             </a:r>
-            <a:endParaRPr lang="en-US" sz="1800" b="0" strike="noStrike" spc="-1" dirty="0">
-              <a:solidFill>
-                <a:srgbClr val="000000"/>
-              </a:solidFill>
-              <a:uFill>
-                <a:solidFill>
-                  <a:srgbClr val="FFFFFF"/>
-                </a:solidFill>
-              </a:uFill>
-              <a:latin typeface="Arial"/>
+            <a:r>
+              <a:rPr lang="en-US" sz="2250" b="0" strike="noStrike" spc="-1" dirty="0">
+                <a:solidFill>
+                  <a:srgbClr val="000000"/>
+                </a:solidFill>
+                <a:uFill>
+                  <a:solidFill>
+                    <a:srgbClr val="FFFFFF"/>
+                  </a:solidFill>
+                </a:uFill>
+                <a:latin typeface="Cambria"/>
+                <a:ea typeface="American Typewriter"/>
+              </a:rPr>
+              <a:t>Method</a:t>
+            </a:r>
+            <a:r>
+              <a:rPr lang="en-US" sz="2250" b="0" strike="noStrike" spc="-1" dirty="0" smtClean="0">
+                <a:solidFill>
+                  <a:srgbClr val="000000"/>
+                </a:solidFill>
+                <a:uFill>
+                  <a:solidFill>
+                    <a:srgbClr val="FFFFFF"/>
+                  </a:solidFill>
+                </a:uFill>
+                <a:latin typeface="Cambria"/>
+                <a:ea typeface="American Typewriter"/>
+              </a:rPr>
+              <a:t>: Purportedly first developed by one Brother </a:t>
+            </a:r>
+            <a:r>
+              <a:rPr lang="en-US" sz="2250" b="0" strike="noStrike" spc="-1" dirty="0" err="1" smtClean="0">
+                <a:solidFill>
+                  <a:srgbClr val="000000"/>
+                </a:solidFill>
+                <a:uFill>
+                  <a:solidFill>
+                    <a:srgbClr val="FFFFFF"/>
+                  </a:solidFill>
+                </a:uFill>
+                <a:latin typeface="Cambria"/>
+                <a:ea typeface="American Typewriter"/>
+              </a:rPr>
+              <a:t>Edvin</a:t>
+            </a:r>
+            <a:r>
+              <a:rPr lang="en-US" sz="2250" b="0" strike="noStrike" spc="-1" dirty="0" smtClean="0">
+                <a:solidFill>
+                  <a:srgbClr val="000000"/>
+                </a:solidFill>
+                <a:uFill>
+                  <a:solidFill>
+                    <a:srgbClr val="FFFFFF"/>
+                  </a:solidFill>
+                </a:uFill>
+                <a:latin typeface="Cambria"/>
+                <a:ea typeface="American Typewriter"/>
+              </a:rPr>
+              <a:t> between 1240 and 1250. No practical application in computing. Numbers are generated by squaring an evenly-</a:t>
+            </a:r>
+            <a:r>
+              <a:rPr lang="en-US" sz="2250" b="0" strike="noStrike" spc="-1" dirty="0" err="1" smtClean="0">
+                <a:solidFill>
+                  <a:srgbClr val="000000"/>
+                </a:solidFill>
+                <a:uFill>
+                  <a:solidFill>
+                    <a:srgbClr val="FFFFFF"/>
+                  </a:solidFill>
+                </a:uFill>
+                <a:latin typeface="Cambria"/>
+                <a:ea typeface="American Typewriter"/>
+              </a:rPr>
+              <a:t>digited</a:t>
+            </a:r>
+            <a:r>
+              <a:rPr lang="en-US" sz="2250" b="0" strike="noStrike" spc="-1" dirty="0" smtClean="0">
+                <a:solidFill>
+                  <a:srgbClr val="000000"/>
+                </a:solidFill>
+                <a:uFill>
+                  <a:solidFill>
+                    <a:srgbClr val="FFFFFF"/>
+                  </a:solidFill>
+                </a:uFill>
+                <a:latin typeface="Cambria"/>
+                <a:ea typeface="American Typewriter"/>
+              </a:rPr>
+              <a:t> number and then taking the middle digits of the result. </a:t>
+            </a:r>
+            <a:r>
+              <a:rPr lang="en-US" sz="2250" spc="-1" dirty="0" smtClean="0">
+                <a:solidFill>
+                  <a:srgbClr val="000000"/>
+                </a:solidFill>
+                <a:uFill>
+                  <a:solidFill>
+                    <a:srgbClr val="FFFFFF"/>
+                  </a:solidFill>
+                </a:uFill>
+                <a:latin typeface="Cambria"/>
+                <a:ea typeface="American Typewriter"/>
+              </a:rPr>
+              <a:t>Predictable, and prone to falling into small periods.  Little benefit from parallelization.</a:t>
+            </a:r>
+            <a:endParaRPr lang="en-US" sz="2250" b="0" strike="noStrike" spc="-1" dirty="0" smtClean="0">
+              <a:solidFill>
+                <a:srgbClr val="000000"/>
+              </a:solidFill>
+              <a:uFill>
+                <a:solidFill>
+                  <a:srgbClr val="FFFFFF"/>
+                </a:solidFill>
+              </a:uFill>
+              <a:latin typeface="Cambria"/>
+              <a:ea typeface="American Typewriter"/>
             </a:endParaRPr>
           </a:p>
           <a:p>
@@ -3428,6 +3596,69 @@
                 <a:spcPct val="100000"/>
               </a:lnSpc>
             </a:pPr>
+            <a:endParaRPr lang="en-US" sz="1800" b="0" strike="noStrike" spc="-1" dirty="0">
+              <a:solidFill>
+                <a:srgbClr val="000000"/>
+              </a:solidFill>
+              <a:uFill>
+                <a:solidFill>
+                  <a:srgbClr val="FFFFFF"/>
+                </a:solidFill>
+              </a:uFill>
+              <a:latin typeface="Arial"/>
+            </a:endParaRPr>
+          </a:p>
+          <a:p>
+            <a:pPr algn="just">
+              <a:lnSpc>
+                <a:spcPct val="100000"/>
+              </a:lnSpc>
+            </a:pPr>
+            <a:r>
+              <a:rPr lang="en-US" sz="2250" b="0" strike="noStrike" spc="-1" dirty="0">
+                <a:solidFill>
+                  <a:srgbClr val="000000"/>
+                </a:solidFill>
+                <a:uFill>
+                  <a:solidFill>
+                    <a:srgbClr val="FFFFFF"/>
+                  </a:solidFill>
+                </a:uFill>
+                <a:latin typeface="Cambria"/>
+                <a:ea typeface="American Typewriter"/>
+              </a:rPr>
+              <a:t>Linear Congruential Generator </a:t>
+            </a:r>
+            <a:r>
+              <a:rPr lang="en-US" sz="2250" b="0" strike="noStrike" spc="-1" dirty="0" smtClean="0">
+                <a:solidFill>
+                  <a:srgbClr val="000000"/>
+                </a:solidFill>
+                <a:uFill>
+                  <a:solidFill>
+                    <a:srgbClr val="FFFFFF"/>
+                  </a:solidFill>
+                </a:uFill>
+                <a:latin typeface="Cambria"/>
+                <a:ea typeface="American Typewriter"/>
+              </a:rPr>
+              <a:t>: One of the best known PRNGs that many implementations currently in use are based off of.  </a:t>
+            </a:r>
+            <a:r>
+              <a:rPr lang="en-US" sz="2250" spc="-1" dirty="0" smtClean="0">
+                <a:solidFill>
+                  <a:srgbClr val="000000"/>
+                </a:solidFill>
+                <a:uFill>
+                  <a:solidFill>
+                    <a:srgbClr val="FFFFFF"/>
+                  </a:solidFill>
+                </a:uFill>
+                <a:latin typeface="Cambria"/>
+                <a:ea typeface="American Typewriter"/>
+              </a:rPr>
+              <a:t>Method involves sequential generation by multiplying the last value given by an incrementing value, and performing a modulus operation. </a:t>
+            </a:r>
             <a:endParaRPr lang="en-US" sz="1800" b="0" strike="noStrike" spc="-1" dirty="0">
               <a:solidFill>
                 <a:srgbClr val="000000"/>
@@ -3516,7 +3747,7 @@
         </p:nvSpPr>
         <p:spPr>
           <a:xfrm>
-            <a:off x="23712817" y="5681370"/>
+            <a:off x="27004680" y="3410399"/>
             <a:ext cx="4881645" cy="594435"/>
           </a:xfrm>
           <a:prstGeom prst="rect">
@@ -3585,7 +3816,7 @@
         </p:nvSpPr>
         <p:spPr>
           <a:xfrm>
-            <a:off x="10436400" y="14998680"/>
+            <a:off x="10480320" y="16232040"/>
             <a:ext cx="11773080" cy="2285640"/>
           </a:xfrm>
           <a:prstGeom prst="rect">
@@ -3618,7 +3849,7 @@
               </a:lnSpc>
             </a:pPr>
             <a:r>
-              <a:rPr lang="en-US" sz="2250" b="0" strike="noStrike" spc="-1">
+              <a:rPr lang="en-US" sz="1800" b="0" strike="noStrike" spc="-1" dirty="0" smtClean="0">
                 <a:solidFill>
                   <a:srgbClr val="000000"/>
                 </a:solidFill>
@@ -3627,13 +3858,32 @@
                     <a:srgbClr val="FFFFFF"/>
                   </a:solidFill>
                 </a:uFill>
-                <a:latin typeface="Cambria"/>
-                <a:ea typeface="American Typewriter"/>
+                <a:latin typeface="Arial"/>
               </a:rPr>
-              <a:t>Synopsis of the work that has been done and a brief breakdown of the our findings. 
-Why or why not something worked while comparing serial to parallelized versions of testing. </a:t>
+              <a:t>Much of our work in this project up to this point has been correctly implementing our PRNG algorithms and establishing our guidelines for testing their usefulness. In the process of attempting to parallelize these PRNGs, we have found that since many of these algorithms employ sequential generation, </a:t>
             </a:r>
-            <a:endParaRPr lang="en-US" sz="1800" b="0" strike="noStrike" spc="-1">
+            <a:r>
+              <a:rPr lang="en-US" spc="-1" dirty="0" smtClean="0">
+                <a:solidFill>
+                  <a:srgbClr val="000000"/>
+                </a:solidFill>
+                <a:uFill>
+                  <a:solidFill>
+                    <a:srgbClr val="FFFFFF"/>
+                  </a:solidFill>
+                </a:uFill>
+                <a:latin typeface="Arial"/>
+              </a:rPr>
+              <a:t>truly ‘parallelizing’ these calculations is less possible, in favor of giving each process a seed based off of the user-provided seed. </a:t>
+            </a:r>
+          </a:p>
+          <a:p>
+            <a:pPr>
+              <a:lnSpc>
+                <a:spcPct val="100000"/>
+              </a:lnSpc>
+            </a:pPr>
+            <a:endParaRPr lang="en-US" sz="1800" b="0" strike="noStrike" spc="-1" dirty="0">
               <a:solidFill>
                 <a:srgbClr val="000000"/>
               </a:solidFill>
@@ -3652,7 +3902,7 @@
               </a:lnSpc>
             </a:pPr>
             <a:r>
-              <a:rPr lang="en-US" sz="2250" b="0" strike="noStrike" spc="-1">
+              <a:rPr lang="en-US" spc="-1" dirty="0" smtClean="0">
                 <a:solidFill>
                   <a:srgbClr val="000000"/>
                 </a:solidFill>
@@ -3661,32 +3911,12 @@
                     <a:srgbClr val="FFFFFF"/>
                   </a:solidFill>
                 </a:uFill>
-                <a:latin typeface="Cambria"/>
-                <a:ea typeface="American Typewriter"/>
+                <a:latin typeface="Arial"/>
               </a:rPr>
-              <a:t>Were the findings that we recorded expected to be seen at the end? Are we happy with the results? What could be changed for future iterations?
-</a:t>
+              <a:t>Our next steps will be to run many, many tests for each of these algorithms for timing and accuracy based off of the Monte Carlo algorithms we have </a:t>
             </a:r>
-            <a:endParaRPr lang="en-US" sz="1800" b="0" strike="noStrike" spc="-1">
-              <a:solidFill>
-                <a:srgbClr val="000000"/>
-              </a:solidFill>
-              <a:uFill>
-                <a:solidFill>
-                  <a:srgbClr val="FFFFFF"/>
-                </a:solidFill>
-              </a:uFill>
-              <a:latin typeface="Arial"/>
-            </a:endParaRPr>
-          </a:p>
-          <a:p>
-            <a:pPr algn="just">
-              <a:lnSpc>
-                <a:spcPct val="100000"/>
-              </a:lnSpc>
-            </a:pPr>
             <a:r>
-              <a:rPr lang="en-US" sz="2250" b="0" strike="noStrike" spc="-1">
+              <a:rPr lang="en-US" spc="-1" smtClean="0">
                 <a:solidFill>
                   <a:srgbClr val="000000"/>
                 </a:solidFill>
@@ -3695,12 +3925,11 @@
                     <a:srgbClr val="FFFFFF"/>
                   </a:solidFill>
                 </a:uFill>
-                <a:latin typeface="Cambria"/>
-                <a:ea typeface="American Typewriter"/>
+                <a:latin typeface="Arial"/>
               </a:rPr>
-              <a:t>Space to the right is reserved for appropriate visuals we can add once this section is completed. </a:t>
+              <a:t>selected.</a:t>
             </a:r>
-            <a:endParaRPr lang="en-US" sz="1800" b="0" strike="noStrike" spc="-1">
+            <a:endParaRPr lang="en-US" sz="1800" b="0" strike="noStrike" spc="-1" dirty="0">
               <a:solidFill>
                 <a:srgbClr val="000000"/>
               </a:solidFill>
@@ -4050,7 +4279,7 @@
         </p:nvSpPr>
         <p:spPr>
           <a:xfrm>
-            <a:off x="17241840" y="9378720"/>
+            <a:off x="17241840" y="9561238"/>
             <a:ext cx="14334840" cy="1371240"/>
           </a:xfrm>
           <a:prstGeom prst="rect">
@@ -4174,7 +4403,7 @@
           <p:cNvPr id="2" name="Picture 1">
             <a:extLst>
               <a:ext uri="{FF2B5EF4-FFF2-40B4-BE49-F238E27FC236}">
-                <a16:creationId xmlns:a16="http://schemas.microsoft.com/office/drawing/2014/main" id="{E6ECB14A-FB62-4BD5-93BB-C9A4BC41BB56}"/>
+                <a16:creationId xmlns:a16="http://schemas.microsoft.com/office/drawing/2014/main" xmlns="" id="{E6ECB14A-FB62-4BD5-93BB-C9A4BC41BB56}"/>
               </a:ext>
             </a:extLst>
           </p:cNvPr>
@@ -4191,7 +4420,7 @@
         </p:blipFill>
         <p:spPr>
           <a:xfrm>
-            <a:off x="23356620" y="4081020"/>
+            <a:off x="27004680" y="3751980"/>
             <a:ext cx="4572000" cy="1504950"/>
           </a:xfrm>
           <a:prstGeom prst="rect">
@@ -4204,7 +4433,7 @@
           <p:cNvPr id="3" name="Picture 2">
             <a:extLst>
               <a:ext uri="{FF2B5EF4-FFF2-40B4-BE49-F238E27FC236}">
-                <a16:creationId xmlns:a16="http://schemas.microsoft.com/office/drawing/2014/main" id="{485197E3-6A65-4E50-B10A-64568CDDFD53}"/>
+                <a16:creationId xmlns:a16="http://schemas.microsoft.com/office/drawing/2014/main" xmlns="" id="{485197E3-6A65-4E50-B10A-64568CDDFD53}"/>
               </a:ext>
             </a:extLst>
           </p:cNvPr>
@@ -4221,7 +4450,7 @@
         </p:blipFill>
         <p:spPr>
           <a:xfrm>
-            <a:off x="28658886" y="4053960"/>
+            <a:off x="28535940" y="6105810"/>
             <a:ext cx="2867025" cy="2295525"/>
           </a:xfrm>
           <a:prstGeom prst="rect">
@@ -4234,7 +4463,7 @@
           <p:cNvPr id="27" name="CustomShape 13">
             <a:extLst>
               <a:ext uri="{FF2B5EF4-FFF2-40B4-BE49-F238E27FC236}">
-                <a16:creationId xmlns:a16="http://schemas.microsoft.com/office/drawing/2014/main" id="{4F54641E-B318-47AD-BE05-89C487720EF0}"/>
+                <a16:creationId xmlns:a16="http://schemas.microsoft.com/office/drawing/2014/main" xmlns="" id="{4F54641E-B318-47AD-BE05-89C487720EF0}"/>
               </a:ext>
             </a:extLst>
           </p:cNvPr>
@@ -4243,7 +4472,7 @@
         </p:nvSpPr>
         <p:spPr>
           <a:xfrm>
-            <a:off x="28236780" y="6379358"/>
+            <a:off x="27804073" y="5708512"/>
             <a:ext cx="4881645" cy="594435"/>
           </a:xfrm>
           <a:prstGeom prst="rect">
@@ -4309,7 +4538,7 @@
           <p:cNvPr id="4" name="Table 3">
             <a:extLst>
               <a:ext uri="{FF2B5EF4-FFF2-40B4-BE49-F238E27FC236}">
-                <a16:creationId xmlns:a16="http://schemas.microsoft.com/office/drawing/2014/main" id="{4F85F7EF-2D6E-4508-AF1C-D5BA25BABA64}"/>
+                <a16:creationId xmlns:a16="http://schemas.microsoft.com/office/drawing/2014/main" xmlns="" id="{4F85F7EF-2D6E-4508-AF1C-D5BA25BABA64}"/>
               </a:ext>
             </a:extLst>
           </p:cNvPr>
@@ -4319,13 +4548,13 @@
           <p:nvPr>
             <p:extLst>
               <p:ext uri="{D42A27DB-BD31-4B8C-83A1-F6EECF244321}">
-                <p14:modId xmlns:p14="http://schemas.microsoft.com/office/powerpoint/2010/main" val="3398005578"/>
+                <p14:modId xmlns:p14="http://schemas.microsoft.com/office/powerpoint/2010/main" val="4202918064"/>
               </p:ext>
             </p:extLst>
           </p:nvPr>
         </p:nvGraphicFramePr>
         <p:xfrm>
-          <a:off x="17241840" y="10669751"/>
+          <a:off x="17241840" y="11168385"/>
           <a:ext cx="14838280" cy="2834640"/>
         </p:xfrm>
         <a:graphic>
@@ -4338,35 +4567,35 @@
                 <a:gridCol w="2967656">
                   <a:extLst>
                     <a:ext uri="{9D8B030D-6E8A-4147-A177-3AD203B41FA5}">
-                      <a16:colId xmlns:a16="http://schemas.microsoft.com/office/drawing/2014/main" val="335167617"/>
+                      <a16:colId xmlns:a16="http://schemas.microsoft.com/office/drawing/2014/main" xmlns="" val="335167617"/>
                     </a:ext>
                   </a:extLst>
                 </a:gridCol>
                 <a:gridCol w="2967656">
                   <a:extLst>
                     <a:ext uri="{9D8B030D-6E8A-4147-A177-3AD203B41FA5}">
-                      <a16:colId xmlns:a16="http://schemas.microsoft.com/office/drawing/2014/main" val="808033953"/>
+                      <a16:colId xmlns:a16="http://schemas.microsoft.com/office/drawing/2014/main" xmlns="" val="808033953"/>
                     </a:ext>
                   </a:extLst>
                 </a:gridCol>
                 <a:gridCol w="2967656">
                   <a:extLst>
                     <a:ext uri="{9D8B030D-6E8A-4147-A177-3AD203B41FA5}">
-                      <a16:colId xmlns:a16="http://schemas.microsoft.com/office/drawing/2014/main" val="165993530"/>
+                      <a16:colId xmlns:a16="http://schemas.microsoft.com/office/drawing/2014/main" xmlns="" val="165993530"/>
                     </a:ext>
                   </a:extLst>
                 </a:gridCol>
                 <a:gridCol w="2967656">
                   <a:extLst>
                     <a:ext uri="{9D8B030D-6E8A-4147-A177-3AD203B41FA5}">
-                      <a16:colId xmlns:a16="http://schemas.microsoft.com/office/drawing/2014/main" val="1302557478"/>
+                      <a16:colId xmlns:a16="http://schemas.microsoft.com/office/drawing/2014/main" xmlns="" val="1302557478"/>
                     </a:ext>
                   </a:extLst>
                 </a:gridCol>
                 <a:gridCol w="2967656">
                   <a:extLst>
                     <a:ext uri="{9D8B030D-6E8A-4147-A177-3AD203B41FA5}">
-                      <a16:colId xmlns:a16="http://schemas.microsoft.com/office/drawing/2014/main" val="3023074935"/>
+                      <a16:colId xmlns:a16="http://schemas.microsoft.com/office/drawing/2014/main" xmlns="" val="3023074935"/>
                     </a:ext>
                   </a:extLst>
                 </a:gridCol>
@@ -4640,7 +4869,7 @@
                 </a:tc>
                 <a:extLst>
                   <a:ext uri="{0D108BD9-81ED-4DB2-BD59-A6C34878D82A}">
-                    <a16:rowId xmlns:a16="http://schemas.microsoft.com/office/drawing/2014/main" val="2961332224"/>
+                    <a16:rowId xmlns:a16="http://schemas.microsoft.com/office/drawing/2014/main" xmlns="" val="2961332224"/>
                   </a:ext>
                 </a:extLst>
               </a:tr>
@@ -4897,7 +5126,7 @@
                 </a:tc>
                 <a:extLst>
                   <a:ext uri="{0D108BD9-81ED-4DB2-BD59-A6C34878D82A}">
-                    <a16:rowId xmlns:a16="http://schemas.microsoft.com/office/drawing/2014/main" val="3609830950"/>
+                    <a16:rowId xmlns:a16="http://schemas.microsoft.com/office/drawing/2014/main" xmlns="" val="3609830950"/>
                   </a:ext>
                 </a:extLst>
               </a:tr>
@@ -5211,7 +5440,7 @@
                 </a:tc>
                 <a:extLst>
                   <a:ext uri="{0D108BD9-81ED-4DB2-BD59-A6C34878D82A}">
-                    <a16:rowId xmlns:a16="http://schemas.microsoft.com/office/drawing/2014/main" val="4286265179"/>
+                    <a16:rowId xmlns:a16="http://schemas.microsoft.com/office/drawing/2014/main" xmlns="" val="4286265179"/>
                   </a:ext>
                 </a:extLst>
               </a:tr>
@@ -5470,11 +5699,11 @@
                     <a:lstStyle/>
                     <a:p>
                       <a:r>
-                        <a:rPr lang="en-US"/>
+                        <a:rPr lang="en-US" dirty="0"/>
                         <a:t>T</a:t>
                       </a:r>
                       <a:r>
-                        <a:rPr lang="en-US" sz="1800" b="0" i="0" kern="1200">
+                        <a:rPr lang="en-US" sz="1800" b="0" i="0" kern="1200" dirty="0">
                           <a:solidFill>
                             <a:schemeClr val="dk1"/>
                           </a:solidFill>
@@ -5529,7 +5758,7 @@
                 </a:tc>
                 <a:extLst>
                   <a:ext uri="{0D108BD9-81ED-4DB2-BD59-A6C34878D82A}">
-                    <a16:rowId xmlns:a16="http://schemas.microsoft.com/office/drawing/2014/main" val="1305601569"/>
+                    <a16:rowId xmlns:a16="http://schemas.microsoft.com/office/drawing/2014/main" xmlns="" val="1305601569"/>
                   </a:ext>
                 </a:extLst>
               </a:tr>
@@ -5537,6 +5766,45 @@
           </a:graphicData>
         </a:graphic>
       </p:graphicFrame>
+      <p:sp>
+        <p:nvSpPr>
+          <p:cNvPr id="5" name="TextBox 4"/>
+          <p:cNvSpPr txBox="1"/>
+          <p:nvPr/>
+        </p:nvSpPr>
+        <p:spPr>
+          <a:xfrm>
+            <a:off x="8558784" y="19762199"/>
+            <a:ext cx="7168896" cy="307777"/>
+          </a:xfrm>
+          <a:prstGeom prst="rect">
+            <a:avLst/>
+          </a:prstGeom>
+          <a:noFill/>
+        </p:spPr>
+        <p:txBody>
+          <a:bodyPr wrap="square" rtlCol="0">
+            <a:spAutoFit/>
+          </a:bodyPr>
+          <a:lstStyle/>
+          <a:p>
+            <a:r>
+              <a:rPr lang="en-US" sz="1400" dirty="0" smtClean="0">
+                <a:latin typeface="Cambria" panose="02040503050406030204" pitchFamily="18" charset="0"/>
+                <a:ea typeface="Cambria" panose="02040503050406030204" pitchFamily="18" charset="0"/>
+              </a:rPr>
+              <a:t>Middle Square Method: https</a:t>
+            </a:r>
+            <a:r>
+              <a:rPr lang="en-US" sz="1400" dirty="0">
+                <a:latin typeface="Cambria" panose="02040503050406030204" pitchFamily="18" charset="0"/>
+                <a:ea typeface="Cambria" panose="02040503050406030204" pitchFamily="18" charset="0"/>
+              </a:rPr>
+              <a:t>://en.wikipedia.org/wiki/Middle-square_method</a:t>
+            </a:r>
+          </a:p>
+        </p:txBody>
+      </p:sp>
     </p:spTree>
   </p:cSld>
   <p:clrMapOvr>

</xml_diff>

<commit_message>
Added more information to poster
</commit_message>
<xml_diff>
--- a/PRNG_PosterRoughDraft.pptx
+++ b/PRNG_PosterRoughDraft.pptx
@@ -2506,7 +2506,7 @@
         <p:spPr>
           <a:xfrm>
             <a:off x="10093320" y="3225959"/>
-            <a:ext cx="21976920" cy="5777535"/>
+            <a:ext cx="21976920" cy="7220951"/>
           </a:xfrm>
           <a:prstGeom prst="rect">
             <a:avLst/>
@@ -2542,8 +2542,8 @@
         </p:nvSpPr>
         <p:spPr>
           <a:xfrm>
-            <a:off x="10093320" y="9220823"/>
-            <a:ext cx="21976920" cy="5028840"/>
+            <a:off x="10093320" y="10644767"/>
+            <a:ext cx="21952440" cy="4775380"/>
           </a:xfrm>
           <a:prstGeom prst="rect">
             <a:avLst/>
@@ -2579,8 +2579,8 @@
         </p:nvSpPr>
         <p:spPr>
           <a:xfrm>
-            <a:off x="9987120" y="15100846"/>
-            <a:ext cx="21976920" cy="3614617"/>
+            <a:off x="10093320" y="15618004"/>
+            <a:ext cx="21952440" cy="3097459"/>
           </a:xfrm>
           <a:prstGeom prst="rect">
             <a:avLst/>
@@ -2732,7 +2732,7 @@
         </p:nvSpPr>
         <p:spPr>
           <a:xfrm>
-            <a:off x="10108692" y="9203655"/>
+            <a:off x="10232280" y="10738616"/>
             <a:ext cx="21813480" cy="771120"/>
           </a:xfrm>
           <a:prstGeom prst="rect">
@@ -2811,7 +2811,7 @@
         </p:nvSpPr>
         <p:spPr>
           <a:xfrm>
-            <a:off x="9987120" y="15129407"/>
+            <a:off x="10150560" y="15645966"/>
             <a:ext cx="21813480" cy="771120"/>
           </a:xfrm>
           <a:prstGeom prst="rect">
@@ -3657,8 +3657,15 @@
                 <a:latin typeface="Cambria"/>
                 <a:ea typeface="American Typewriter"/>
               </a:rPr>
-              <a:t>Method involves sequential generation by multiplying the last value given by an incrementing value, and performing a modulus operation. </a:t>
+              <a:t>Method involves sequential generation by multiplying the last value given by an incrementing value, and performing a modulus operation. Generally improves through parallelization, but primarily through scheduling the overall task to different nodes, rather than any internal parallelization.  </a:t>
             </a:r>
+          </a:p>
+          <a:p>
+            <a:pPr algn="just">
+              <a:lnSpc>
+                <a:spcPct val="100000"/>
+              </a:lnSpc>
+            </a:pPr>
             <a:endParaRPr lang="en-US" sz="1800" b="0" strike="noStrike" spc="-1" dirty="0">
               <a:solidFill>
                 <a:srgbClr val="000000"/>
@@ -3705,7 +3712,97 @@
                 <a:latin typeface="Cambria"/>
                 <a:ea typeface="American Typewriter"/>
               </a:rPr>
-              <a:t>: Brief explanation of what it does, and what the parallelizing it should improve </a:t>
+              <a:t>: </a:t>
+            </a:r>
+            <a:r>
+              <a:rPr lang="en-US" sz="2250" b="0" strike="noStrike" spc="-1" dirty="0" err="1" smtClean="0">
+                <a:solidFill>
+                  <a:srgbClr val="000000"/>
+                </a:solidFill>
+                <a:uFill>
+                  <a:solidFill>
+                    <a:srgbClr val="FFFFFF"/>
+                  </a:solidFill>
+                </a:uFill>
+                <a:latin typeface="Cambria"/>
+                <a:ea typeface="American Typewriter"/>
+              </a:rPr>
+              <a:t>Threefry</a:t>
+            </a:r>
+            <a:r>
+              <a:rPr lang="en-US" sz="2250" b="0" strike="noStrike" spc="-1" dirty="0" smtClean="0">
+                <a:solidFill>
+                  <a:srgbClr val="000000"/>
+                </a:solidFill>
+                <a:uFill>
+                  <a:solidFill>
+                    <a:srgbClr val="FFFFFF"/>
+                  </a:solidFill>
+                </a:uFill>
+                <a:latin typeface="Cambria"/>
+                <a:ea typeface="American Typewriter"/>
+              </a:rPr>
+              <a:t> is a PRNG that is designed for parallelization. The process of generating a number involves performing a calculation on a base value that corresponds to an incrementing value which can be tracked globally. Parallelizing simply involves incrementing this counter, since the calculations </a:t>
+            </a:r>
+            <a:r>
+              <a:rPr lang="en-US" sz="2250" spc="-1" dirty="0" smtClean="0">
+                <a:solidFill>
+                  <a:srgbClr val="000000"/>
+                </a:solidFill>
+                <a:uFill>
+                  <a:solidFill>
+                    <a:srgbClr val="FFFFFF"/>
+                  </a:solidFill>
+                </a:uFill>
+                <a:latin typeface="Cambria"/>
+                <a:ea typeface="American Typewriter"/>
+              </a:rPr>
+              <a:t>depend on the value of the counter. </a:t>
+            </a:r>
+            <a:r>
+              <a:rPr lang="en-US" sz="2250" b="0" strike="noStrike" spc="-1" dirty="0" smtClean="0">
+                <a:solidFill>
+                  <a:srgbClr val="000000"/>
+                </a:solidFill>
+                <a:uFill>
+                  <a:solidFill>
+                    <a:srgbClr val="FFFFFF"/>
+                  </a:solidFill>
+                </a:uFill>
+                <a:latin typeface="Cambria"/>
+                <a:ea typeface="American Typewriter"/>
+              </a:rPr>
+              <a:t> </a:t>
+            </a:r>
+            <a:r>
+              <a:rPr lang="en-US" sz="2250" b="0" strike="noStrike" spc="-1" dirty="0" err="1" smtClean="0">
+                <a:solidFill>
+                  <a:srgbClr val="000000"/>
+                </a:solidFill>
+                <a:uFill>
+                  <a:solidFill>
+                    <a:srgbClr val="FFFFFF"/>
+                  </a:solidFill>
+                </a:uFill>
+                <a:latin typeface="Cambria"/>
+                <a:ea typeface="American Typewriter"/>
+              </a:rPr>
+              <a:t>Threefry</a:t>
+            </a:r>
+            <a:r>
+              <a:rPr lang="en-US" sz="2250" b="0" strike="noStrike" spc="-1" dirty="0" smtClean="0">
+                <a:solidFill>
+                  <a:srgbClr val="000000"/>
+                </a:solidFill>
+                <a:uFill>
+                  <a:solidFill>
+                    <a:srgbClr val="FFFFFF"/>
+                  </a:solidFill>
+                </a:uFill>
+                <a:latin typeface="Cambria"/>
+                <a:ea typeface="American Typewriter"/>
+              </a:rPr>
+              <a:t> benefits appreciably from parallelization. </a:t>
             </a:r>
             <a:endParaRPr lang="en-US" sz="1800" b="0" strike="noStrike" spc="-1" dirty="0">
               <a:solidFill>
@@ -3816,8 +3913,8 @@
         </p:nvSpPr>
         <p:spPr>
           <a:xfrm>
-            <a:off x="10480320" y="16232040"/>
-            <a:ext cx="11773080" cy="2285640"/>
+            <a:off x="10436400" y="16614943"/>
+            <a:ext cx="20724820" cy="1901632"/>
           </a:xfrm>
           <a:prstGeom prst="rect">
             <a:avLst/>
@@ -3913,21 +4010,7 @@
                 </a:uFill>
                 <a:latin typeface="Arial"/>
               </a:rPr>
-              <a:t>Our next steps will be to run many, many tests for each of these algorithms for timing and accuracy based off of the Monte Carlo algorithms we have </a:t>
-            </a:r>
-            <a:r>
-              <a:rPr lang="en-US" spc="-1" smtClean="0">
-                <a:solidFill>
-                  <a:srgbClr val="000000"/>
-                </a:solidFill>
-                <a:uFill>
-                  <a:solidFill>
-                    <a:srgbClr val="FFFFFF"/>
-                  </a:solidFill>
-                </a:uFill>
-                <a:latin typeface="Arial"/>
-              </a:rPr>
-              <a:t>selected.</a:t>
+              <a:t>Our next steps will be to run a full suite of tests for each of these algorithms for timing and accuracy based off of the Monte Carlo algorithms we have selected.</a:t>
             </a:r>
             <a:endParaRPr lang="en-US" sz="1800" b="0" strike="noStrike" spc="-1" dirty="0">
               <a:solidFill>
@@ -4191,7 +4274,7 @@
               </a:lnSpc>
             </a:pPr>
             <a:r>
-              <a:rPr lang="en-US" sz="2000" b="0" strike="noStrike" spc="-1">
+              <a:rPr lang="en-US" sz="2000" b="0" strike="noStrike" spc="-1" dirty="0">
                 <a:solidFill>
                   <a:srgbClr val="000000"/>
                 </a:solidFill>
@@ -4206,7 +4289,7 @@
               <a:t>
 </a:t>
             </a:r>
-            <a:endParaRPr lang="en-US" sz="1800" b="0" strike="noStrike" spc="-1">
+            <a:endParaRPr lang="en-US" sz="1800" b="0" strike="noStrike" spc="-1" dirty="0">
               <a:solidFill>
                 <a:srgbClr val="000000"/>
               </a:solidFill>
@@ -4225,7 +4308,7 @@
               </a:lnSpc>
             </a:pPr>
             <a:r>
-              <a:rPr lang="en-US" sz="2250" b="0" strike="noStrike" spc="-1">
+              <a:rPr lang="en-US" sz="2250" b="0" strike="noStrike" spc="-1" dirty="0">
                 <a:solidFill>
                   <a:srgbClr val="000000"/>
                 </a:solidFill>
@@ -4239,7 +4322,7 @@
               </a:rPr>
               <a:t>The goal of our project is to evaluate the usefulness of various pseudo-random number generators for Monte Carlo experimentation. Many PRNGs, while useful for a wide variety of applications, are flawed in their ability to evenly distribute their results across a given range. These problems are especially exacerbated in seeded PRNGs. Many efficient and well-distributed algorithms exist, but some of these can be computationally expensive. We would like to explore how parallelization may help some less-desirable PRNG algorithms to meet the needs of Monte Carlo experimentation for a number of different problems, or how it might even hinder them further. </a:t>
             </a:r>
-            <a:endParaRPr lang="en-US" sz="1800" b="0" strike="noStrike" spc="-1">
+            <a:endParaRPr lang="en-US" sz="1800" b="0" strike="noStrike" spc="-1" dirty="0">
               <a:solidFill>
                 <a:srgbClr val="000000"/>
               </a:solidFill>
@@ -4257,7 +4340,7 @@
                 <a:spcPct val="100000"/>
               </a:lnSpc>
             </a:pPr>
-            <a:endParaRPr lang="en-US" sz="1800" b="0" strike="noStrike" spc="-1">
+            <a:endParaRPr lang="en-US" sz="1800" b="0" strike="noStrike" spc="-1" dirty="0">
               <a:solidFill>
                 <a:srgbClr val="000000"/>
               </a:solidFill>
@@ -4279,8 +4362,8 @@
         </p:nvSpPr>
         <p:spPr>
           <a:xfrm>
-            <a:off x="17241840" y="9561238"/>
-            <a:ext cx="14334840" cy="1371240"/>
+            <a:off x="10436400" y="11608506"/>
+            <a:ext cx="5814342" cy="1371240"/>
           </a:xfrm>
           <a:prstGeom prst="rect">
             <a:avLst/>
@@ -4312,7 +4395,7 @@
               </a:lnSpc>
             </a:pPr>
             <a:r>
-              <a:rPr lang="en-US" sz="2100" b="0" strike="noStrike" spc="-1" dirty="0">
+              <a:rPr lang="en-US" sz="2100" spc="-1" dirty="0" smtClean="0">
                 <a:solidFill>
                   <a:srgbClr val="000000"/>
                 </a:solidFill>
@@ -4324,8 +4407,50 @@
                 <a:latin typeface="Cambria"/>
                 <a:ea typeface="American Typewriter"/>
               </a:rPr>
-              <a:t>The results of the testing of our methods mentioned above. Placeholder image to the left that I assume is replaced by graphs of our findings displaying the serial vs parallelized versions of each method. The graphs can focus on two main criteria for solving the MCS problems; a comparison between the speed and accuracy of the two. By increasing one, are we giving up any of the other.</a:t>
+              <a:t>At this stage, we have gathered results to analyze the standard deviation of numbers generated by each PRNG. While these results</a:t>
             </a:r>
+            <a:r>
+              <a:rPr lang="en-US" sz="2100" spc="-1" dirty="0">
+                <a:solidFill>
+                  <a:srgbClr val="000000"/>
+                </a:solidFill>
+                <a:uFill>
+                  <a:solidFill>
+                    <a:srgbClr val="FFFFFF"/>
+                  </a:solidFill>
+                </a:uFill>
+                <a:latin typeface="Cambria"/>
+                <a:ea typeface="American Typewriter"/>
+              </a:rPr>
+              <a:t> </a:t>
+            </a:r>
+            <a:r>
+              <a:rPr lang="en-US" sz="2100" spc="-1" dirty="0" smtClean="0">
+                <a:solidFill>
+                  <a:srgbClr val="000000"/>
+                </a:solidFill>
+                <a:uFill>
+                  <a:solidFill>
+                    <a:srgbClr val="FFFFFF"/>
+                  </a:solidFill>
+                </a:uFill>
+                <a:latin typeface="Cambria"/>
+                <a:ea typeface="American Typewriter"/>
+              </a:rPr>
+              <a:t>are by no means conclusive, they do offer some insight in to the quality of each of these PRNGs. For example, when considering the middle-square method, the minimum and maximum values are relatively close to the mean, which means that in general, the value generated by this algorithm tend to have a less even spread than, for example, LCG, which has a much greater spread. </a:t>
+            </a:r>
+            <a:endParaRPr lang="en-US" sz="2100" spc="-1" dirty="0" smtClean="0">
+              <a:solidFill>
+                <a:srgbClr val="000000"/>
+              </a:solidFill>
+              <a:uFill>
+                <a:solidFill>
+                  <a:srgbClr val="FFFFFF"/>
+                </a:solidFill>
+              </a:uFill>
+              <a:latin typeface="Cambria"/>
+              <a:ea typeface="American Typewriter"/>
+            </a:endParaRPr>
           </a:p>
         </p:txBody>
       </p:sp>
@@ -4548,13 +4673,13 @@
           <p:nvPr>
             <p:extLst>
               <p:ext uri="{D42A27DB-BD31-4B8C-83A1-F6EECF244321}">
-                <p14:modId xmlns:p14="http://schemas.microsoft.com/office/powerpoint/2010/main" val="4202918064"/>
+                <p14:modId xmlns:p14="http://schemas.microsoft.com/office/powerpoint/2010/main" val="4171939755"/>
               </p:ext>
             </p:extLst>
           </p:nvPr>
         </p:nvGraphicFramePr>
         <p:xfrm>
-          <a:off x="17241840" y="11168385"/>
+          <a:off x="16738400" y="11755604"/>
           <a:ext cx="14838280" cy="2834640"/>
         </p:xfrm>
         <a:graphic>
@@ -4600,7 +4725,7 @@
                   </a:extLst>
                 </a:gridCol>
               </a:tblGrid>
-              <a:tr h="323303">
+              <a:tr h="0">
                 <a:tc>
                   <a:txBody>
                     <a:bodyPr/>

</xml_diff>